<commit_message>
update combinatorial bloom filter
</commit_message>
<xml_diff>
--- a/常见sketch算法.pptx
+++ b/常见sketch算法.pptx
@@ -7,10 +7,10 @@
     <p:sldMasterId id="2147483677" r:id="rId3"/>
   </p:sldMasterIdLst>
   <p:notesMasterIdLst>
-    <p:notesMasterId r:id="rId14"/>
+    <p:notesMasterId r:id="rId15"/>
   </p:notesMasterIdLst>
   <p:handoutMasterIdLst>
-    <p:handoutMasterId r:id="rId15"/>
+    <p:handoutMasterId r:id="rId16"/>
   </p:handoutMasterIdLst>
   <p:sldIdLst>
     <p:sldId id="256" r:id="rId4"/>
@@ -23,6 +23,7 @@
     <p:sldId id="265" r:id="rId11"/>
     <p:sldId id="264" r:id="rId12"/>
     <p:sldId id="266" r:id="rId13"/>
+    <p:sldId id="267" r:id="rId14"/>
   </p:sldIdLst>
   <p:sldSz cx="9144000" cy="6858000" type="screen4x3"/>
   <p:notesSz cx="6858000" cy="9144000"/>
@@ -714,6 +715,90 @@
     <p:extLst>
       <p:ext uri="{BB962C8B-B14F-4D97-AF65-F5344CB8AC3E}">
         <p14:creationId xmlns:p14="http://schemas.microsoft.com/office/powerpoint/2010/main" val="1397716978"/>
+      </p:ext>
+    </p:extLst>
+  </p:cSld>
+  <p:clrMapOvr>
+    <a:masterClrMapping/>
+  </p:clrMapOvr>
+</p:notes>
+</file>
+
+<file path=ppt/notesSlides/notesSlide2.xml><?xml version="1.0" encoding="utf-8"?>
+<p:notes xmlns:a="http://schemas.openxmlformats.org/drawingml/2006/main" xmlns:r="http://schemas.openxmlformats.org/officeDocument/2006/relationships" xmlns:p="http://schemas.openxmlformats.org/presentationml/2006/main">
+  <p:cSld>
+    <p:spTree>
+      <p:nvGrpSpPr>
+        <p:cNvPr id="1" name=""/>
+        <p:cNvGrpSpPr/>
+        <p:nvPr/>
+      </p:nvGrpSpPr>
+      <p:grpSpPr>
+        <a:xfrm>
+          <a:off x="0" y="0"/>
+          <a:ext cx="0" cy="0"/>
+          <a:chOff x="0" y="0"/>
+          <a:chExt cx="0" cy="0"/>
+        </a:xfrm>
+      </p:grpSpPr>
+      <p:sp>
+        <p:nvSpPr>
+          <p:cNvPr id="2" name="幻灯片图像占位符 1"/>
+          <p:cNvSpPr>
+            <a:spLocks noGrp="1" noRot="1" noChangeAspect="1"/>
+          </p:cNvSpPr>
+          <p:nvPr>
+            <p:ph type="sldImg"/>
+          </p:nvPr>
+        </p:nvSpPr>
+        <p:spPr/>
+      </p:sp>
+      <p:sp>
+        <p:nvSpPr>
+          <p:cNvPr id="3" name="备注占位符 2"/>
+          <p:cNvSpPr>
+            <a:spLocks noGrp="1"/>
+          </p:cNvSpPr>
+          <p:nvPr>
+            <p:ph type="body" idx="1"/>
+          </p:nvPr>
+        </p:nvSpPr>
+        <p:spPr/>
+        <p:txBody>
+          <a:bodyPr/>
+          <a:lstStyle/>
+          <a:p>
+            <a:endParaRPr kumimoji="1" lang="zh-CN" altLang="en-US"/>
+          </a:p>
+        </p:txBody>
+      </p:sp>
+      <p:sp>
+        <p:nvSpPr>
+          <p:cNvPr id="4" name="幻灯片编号占位符 3"/>
+          <p:cNvSpPr>
+            <a:spLocks noGrp="1"/>
+          </p:cNvSpPr>
+          <p:nvPr>
+            <p:ph type="sldNum" sz="quarter" idx="10"/>
+          </p:nvPr>
+        </p:nvSpPr>
+        <p:spPr/>
+        <p:txBody>
+          <a:bodyPr/>
+          <a:lstStyle/>
+          <a:p>
+            <a:fld id="{0584BD34-D176-C348-8AB0-78FD87C6D9AC}" type="slidenum">
+              <a:rPr lang="uk-UA"/>
+              <a:t>11</a:t>
+            </a:fld>
+            <a:endParaRPr kumimoji="1" lang="uk-UA" altLang="zh-CN"/>
+          </a:p>
+        </p:txBody>
+      </p:sp>
+    </p:spTree>
+    <p:extLst>
+      <p:ext uri="{BB962C8B-B14F-4D97-AF65-F5344CB8AC3E}">
+        <p14:creationId xmlns:p14="http://schemas.microsoft.com/office/powerpoint/2010/main" val="297226021"/>
       </p:ext>
     </p:extLst>
   </p:cSld>
@@ -7815,6 +7900,2757 @@
 </p:sld>
 </file>
 
+<file path=ppt/slides/slide11.xml><?xml version="1.0" encoding="utf-8"?>
+<p:sld xmlns:a="http://schemas.openxmlformats.org/drawingml/2006/main" xmlns:r="http://schemas.openxmlformats.org/officeDocument/2006/relationships" xmlns:p="http://schemas.openxmlformats.org/presentationml/2006/main">
+  <p:cSld>
+    <p:spTree>
+      <p:nvGrpSpPr>
+        <p:cNvPr id="1" name=""/>
+        <p:cNvGrpSpPr/>
+        <p:nvPr/>
+      </p:nvGrpSpPr>
+      <p:grpSpPr>
+        <a:xfrm>
+          <a:off x="0" y="0"/>
+          <a:ext cx="0" cy="0"/>
+          <a:chOff x="0" y="0"/>
+          <a:chExt cx="0" cy="0"/>
+        </a:xfrm>
+      </p:grpSpPr>
+      <p:sp>
+        <p:nvSpPr>
+          <p:cNvPr id="2" name="标题 1"/>
+          <p:cNvSpPr>
+            <a:spLocks noGrp="1"/>
+          </p:cNvSpPr>
+          <p:nvPr>
+            <p:ph type="title"/>
+          </p:nvPr>
+        </p:nvSpPr>
+        <p:spPr/>
+        <p:txBody>
+          <a:bodyPr/>
+          <a:lstStyle/>
+          <a:p>
+            <a:r>
+              <a:rPr kumimoji="1" lang="en-US" altLang="zh-CN"/>
+              <a:t>Combinatorial Bloom Filter</a:t>
+            </a:r>
+            <a:endParaRPr kumimoji="1" lang="zh-CN" altLang="en-US"/>
+          </a:p>
+        </p:txBody>
+      </p:sp>
+      <p:sp>
+        <p:nvSpPr>
+          <p:cNvPr id="4" name="内容占位符 2"/>
+          <p:cNvSpPr>
+            <a:spLocks noGrp="1"/>
+          </p:cNvSpPr>
+          <p:nvPr>
+            <p:ph idx="1"/>
+          </p:nvPr>
+        </p:nvSpPr>
+        <p:spPr>
+          <a:xfrm>
+            <a:off x="358774" y="1142659"/>
+            <a:ext cx="9188637" cy="6360800"/>
+          </a:xfrm>
+        </p:spPr>
+        <p:txBody>
+          <a:bodyPr>
+            <a:normAutofit/>
+          </a:bodyPr>
+          <a:lstStyle/>
+          <a:p>
+            <a:pPr>
+              <a:spcBef>
+                <a:spcPts val="0"/>
+              </a:spcBef>
+              <a:defRPr/>
+            </a:pPr>
+            <a:r>
+              <a:rPr kumimoji="1" lang="zh-CN" altLang="en-US" sz="2000"/>
+              <a:t>作用：多集合元素存在性查询</a:t>
+            </a:r>
+            <a:endParaRPr kumimoji="1" lang="en-US" altLang="zh-CN" sz="2000"/>
+          </a:p>
+          <a:p>
+            <a:pPr>
+              <a:spcBef>
+                <a:spcPts val="0"/>
+              </a:spcBef>
+              <a:defRPr/>
+            </a:pPr>
+            <a:r>
+              <a:rPr kumimoji="1" lang="en-US" altLang="zh-CN" sz="2000"/>
+              <a:t>Motivation</a:t>
+            </a:r>
+            <a:r>
+              <a:rPr kumimoji="1" lang="zh-CN" altLang="en-US" sz="2000"/>
+              <a:t>：希望只想使用一个</a:t>
+            </a:r>
+            <a:r>
+              <a:rPr kumimoji="1" lang="en-US" altLang="zh-CN" sz="2000"/>
+              <a:t>bloom</a:t>
+            </a:r>
+            <a:r>
+              <a:rPr kumimoji="1" lang="zh-CN" altLang="en-US" sz="2000"/>
+              <a:t> </a:t>
+            </a:r>
+            <a:r>
+              <a:rPr kumimoji="1" lang="en-US" altLang="zh-CN" sz="2000"/>
+              <a:t>filter</a:t>
+            </a:r>
+          </a:p>
+          <a:p>
+            <a:pPr>
+              <a:spcBef>
+                <a:spcPts val="0"/>
+              </a:spcBef>
+              <a:defRPr/>
+            </a:pPr>
+            <a:r>
+              <a:rPr kumimoji="1" lang="zh-CN" altLang="en-US" sz="2000"/>
+              <a:t>改进：</a:t>
+            </a:r>
+            <a:r>
+              <a:rPr kumimoji="1" lang="zh-CN" altLang="en-US" sz="2000"/>
+              <a:t>用不同的</a:t>
+            </a:r>
+            <a:r>
+              <a:rPr kumimoji="1" lang="en-US" altLang="zh-CN" sz="2000"/>
+              <a:t>hash</a:t>
+            </a:r>
+            <a:r>
+              <a:rPr kumimoji="1" lang="zh-CN" altLang="en-US" sz="2000"/>
+              <a:t>函数组，来表示不同的集合</a:t>
+            </a:r>
+            <a:endParaRPr kumimoji="1" lang="en-US" altLang="zh-CN" sz="2000"/>
+          </a:p>
+          <a:p>
+            <a:pPr>
+              <a:spcBef>
+                <a:spcPts val="0"/>
+              </a:spcBef>
+              <a:defRPr/>
+            </a:pPr>
+            <a:endParaRPr kumimoji="1" lang="en-US" altLang="zh-CN" sz="2000"/>
+          </a:p>
+          <a:p>
+            <a:pPr>
+              <a:spcBef>
+                <a:spcPts val="0"/>
+              </a:spcBef>
+              <a:defRPr/>
+            </a:pPr>
+            <a:endParaRPr kumimoji="1" lang="en-US" altLang="zh-CN" sz="2000"/>
+          </a:p>
+          <a:p>
+            <a:pPr>
+              <a:spcBef>
+                <a:spcPts val="0"/>
+              </a:spcBef>
+              <a:defRPr/>
+            </a:pPr>
+            <a:endParaRPr kumimoji="1" lang="en-US" altLang="zh-CN" sz="2000"/>
+          </a:p>
+          <a:p>
+            <a:pPr>
+              <a:spcBef>
+                <a:spcPts val="0"/>
+              </a:spcBef>
+              <a:defRPr/>
+            </a:pPr>
+            <a:endParaRPr kumimoji="1" lang="en-US" altLang="zh-CN" sz="2000"/>
+          </a:p>
+          <a:p>
+            <a:pPr>
+              <a:spcBef>
+                <a:spcPts val="0"/>
+              </a:spcBef>
+              <a:defRPr/>
+            </a:pPr>
+            <a:endParaRPr kumimoji="1" lang="en-US" altLang="zh-CN" sz="2000"/>
+          </a:p>
+          <a:p>
+            <a:pPr>
+              <a:spcBef>
+                <a:spcPts val="0"/>
+              </a:spcBef>
+              <a:defRPr/>
+            </a:pPr>
+            <a:endParaRPr kumimoji="1" lang="en-US" altLang="zh-CN" sz="2000"/>
+          </a:p>
+          <a:p>
+            <a:pPr>
+              <a:spcBef>
+                <a:spcPts val="0"/>
+              </a:spcBef>
+              <a:defRPr/>
+            </a:pPr>
+            <a:endParaRPr kumimoji="1" lang="en-US" altLang="zh-CN" sz="2000"/>
+          </a:p>
+          <a:p>
+            <a:pPr>
+              <a:spcBef>
+                <a:spcPts val="0"/>
+              </a:spcBef>
+              <a:defRPr/>
+            </a:pPr>
+            <a:endParaRPr kumimoji="1" lang="en-US" altLang="zh-CN" sz="2000"/>
+          </a:p>
+          <a:p>
+            <a:pPr>
+              <a:spcBef>
+                <a:spcPts val="0"/>
+              </a:spcBef>
+              <a:defRPr/>
+            </a:pPr>
+            <a:r>
+              <a:rPr kumimoji="1" lang="zh-CN" altLang="en-US" sz="1600"/>
+              <a:t>也可以</a:t>
+            </a:r>
+            <a:r>
+              <a:rPr kumimoji="1" lang="zh-CN" altLang="en-US" sz="1600"/>
+              <a:t>利用</a:t>
+            </a:r>
+            <a:r>
+              <a:rPr kumimoji="1" lang="en-US" altLang="zh-CN" sz="1600"/>
+              <a:t>Coded</a:t>
+            </a:r>
+            <a:r>
+              <a:rPr kumimoji="1" lang="zh-CN" altLang="en-US" sz="1600"/>
+              <a:t> </a:t>
+            </a:r>
+            <a:r>
+              <a:rPr kumimoji="1" lang="en-US" altLang="zh-CN" sz="1600"/>
+              <a:t>Bloom</a:t>
+            </a:r>
+            <a:r>
+              <a:rPr kumimoji="1" lang="zh-CN" altLang="en-US" sz="1600"/>
+              <a:t> </a:t>
+            </a:r>
+            <a:r>
+              <a:rPr kumimoji="1" lang="en-US" altLang="zh-CN" sz="1600"/>
+              <a:t>Filter</a:t>
+            </a:r>
+            <a:r>
+              <a:rPr kumimoji="1" lang="zh-CN" altLang="en-US" sz="1600"/>
+              <a:t>的思想：不同</a:t>
+            </a:r>
+            <a:r>
+              <a:rPr kumimoji="1" lang="en-US" altLang="zh-CN" sz="1600"/>
+              <a:t>hash</a:t>
+            </a:r>
+            <a:r>
+              <a:rPr kumimoji="1" lang="zh-CN" altLang="en-US" sz="1600"/>
+              <a:t>函数组表示</a:t>
+            </a:r>
+            <a:r>
+              <a:rPr kumimoji="1" lang="zh-CN" altLang="en-US" sz="1600"/>
+              <a:t>集合</a:t>
+            </a:r>
+            <a:r>
+              <a:rPr kumimoji="1" lang="en-US" altLang="zh-CN" sz="1600"/>
+              <a:t>ID</a:t>
+            </a:r>
+            <a:r>
+              <a:rPr kumimoji="1" lang="zh-CN" altLang="en-US" sz="1600"/>
+              <a:t>的不同比特</a:t>
+            </a:r>
+            <a:endParaRPr kumimoji="1" lang="en-US" altLang="zh-CN" sz="1600"/>
+          </a:p>
+          <a:p>
+            <a:pPr>
+              <a:spcBef>
+                <a:spcPts val="0"/>
+              </a:spcBef>
+              <a:defRPr/>
+            </a:pPr>
+            <a:endParaRPr kumimoji="1" lang="en-US" altLang="zh-CN" sz="2000"/>
+          </a:p>
+        </p:txBody>
+      </p:sp>
+      <p:graphicFrame>
+        <p:nvGraphicFramePr>
+          <p:cNvPr id="3" name="表格 2"/>
+          <p:cNvGraphicFramePr>
+            <a:graphicFrameLocks noGrp="1"/>
+          </p:cNvGraphicFramePr>
+          <p:nvPr>
+            <p:extLst>
+              <p:ext uri="{D42A27DB-BD31-4B8C-83A1-F6EECF244321}">
+                <p14:modId xmlns:p14="http://schemas.microsoft.com/office/powerpoint/2010/main" val="1812973250"/>
+              </p:ext>
+            </p:extLst>
+          </p:nvPr>
+        </p:nvGraphicFramePr>
+        <p:xfrm>
+          <a:off x="972000" y="5532537"/>
+          <a:ext cx="7200000" cy="365760"/>
+        </p:xfrm>
+        <a:graphic>
+          <a:graphicData uri="http://schemas.openxmlformats.org/drawingml/2006/table">
+            <a:tbl>
+              <a:tblPr firstRow="1" bandRow="1">
+                <a:tableStyleId>{5C22544A-7EE6-4342-B048-85BDC9FD1C3A}</a:tableStyleId>
+              </a:tblPr>
+              <a:tblGrid>
+                <a:gridCol w="360000"/>
+                <a:gridCol w="360000"/>
+                <a:gridCol w="360000"/>
+                <a:gridCol w="360000"/>
+                <a:gridCol w="360000"/>
+                <a:gridCol w="360000"/>
+                <a:gridCol w="360000"/>
+                <a:gridCol w="360000"/>
+                <a:gridCol w="360000"/>
+                <a:gridCol w="360000"/>
+                <a:gridCol w="360000"/>
+                <a:gridCol w="360000"/>
+                <a:gridCol w="360000"/>
+                <a:gridCol w="360000"/>
+                <a:gridCol w="360000"/>
+                <a:gridCol w="360000"/>
+                <a:gridCol w="360000"/>
+                <a:gridCol w="360000"/>
+                <a:gridCol w="360000"/>
+                <a:gridCol w="360000"/>
+              </a:tblGrid>
+              <a:tr h="360000">
+                <a:tc>
+                  <a:txBody>
+                    <a:bodyPr/>
+                    <a:lstStyle/>
+                    <a:p>
+                      <a:endParaRPr lang="zh-CN" altLang="en-US"/>
+                    </a:p>
+                  </a:txBody>
+                  <a:tcPr>
+                    <a:lnL w="12700" cap="flat" cmpd="sng" algn="ctr">
+                      <a:solidFill>
+                        <a:schemeClr val="tx1"/>
+                      </a:solidFill>
+                      <a:prstDash val="solid"/>
+                      <a:round/>
+                      <a:headEnd type="none" w="med" len="med"/>
+                      <a:tailEnd type="none" w="med" len="med"/>
+                    </a:lnL>
+                    <a:lnR w="12700" cap="flat" cmpd="sng" algn="ctr">
+                      <a:solidFill>
+                        <a:schemeClr val="tx1"/>
+                      </a:solidFill>
+                      <a:prstDash val="solid"/>
+                      <a:round/>
+                      <a:headEnd type="none" w="med" len="med"/>
+                      <a:tailEnd type="none" w="med" len="med"/>
+                    </a:lnR>
+                    <a:lnT w="12700" cap="flat" cmpd="sng" algn="ctr">
+                      <a:solidFill>
+                        <a:schemeClr val="tx1"/>
+                      </a:solidFill>
+                      <a:prstDash val="solid"/>
+                      <a:round/>
+                      <a:headEnd type="none" w="med" len="med"/>
+                      <a:tailEnd type="none" w="med" len="med"/>
+                    </a:lnT>
+                    <a:lnB w="12700" cap="flat" cmpd="sng" algn="ctr">
+                      <a:solidFill>
+                        <a:schemeClr val="tx1"/>
+                      </a:solidFill>
+                      <a:prstDash val="solid"/>
+                      <a:round/>
+                      <a:headEnd type="none" w="med" len="med"/>
+                      <a:tailEnd type="none" w="med" len="med"/>
+                    </a:lnB>
+                    <a:lnTlToBr w="12700" cmpd="sng">
+                      <a:noFill/>
+                      <a:prstDash val="solid"/>
+                    </a:lnTlToBr>
+                    <a:lnBlToTr w="12700" cmpd="sng">
+                      <a:noFill/>
+                      <a:prstDash val="solid"/>
+                    </a:lnBlToTr>
+                    <a:solidFill>
+                      <a:schemeClr val="bg1">
+                        <a:lumMod val="95000"/>
+                      </a:schemeClr>
+                    </a:solidFill>
+                  </a:tcPr>
+                </a:tc>
+                <a:tc>
+                  <a:txBody>
+                    <a:bodyPr/>
+                    <a:lstStyle/>
+                    <a:p>
+                      <a:endParaRPr lang="zh-CN" altLang="en-US"/>
+                    </a:p>
+                  </a:txBody>
+                  <a:tcPr>
+                    <a:lnL w="12700" cap="flat" cmpd="sng" algn="ctr">
+                      <a:solidFill>
+                        <a:schemeClr val="tx1"/>
+                      </a:solidFill>
+                      <a:prstDash val="solid"/>
+                      <a:round/>
+                      <a:headEnd type="none" w="med" len="med"/>
+                      <a:tailEnd type="none" w="med" len="med"/>
+                    </a:lnL>
+                    <a:lnR w="12700" cap="flat" cmpd="sng" algn="ctr">
+                      <a:solidFill>
+                        <a:schemeClr val="tx1"/>
+                      </a:solidFill>
+                      <a:prstDash val="solid"/>
+                      <a:round/>
+                      <a:headEnd type="none" w="med" len="med"/>
+                      <a:tailEnd type="none" w="med" len="med"/>
+                    </a:lnR>
+                    <a:lnT w="12700" cap="flat" cmpd="sng" algn="ctr">
+                      <a:solidFill>
+                        <a:schemeClr val="tx1"/>
+                      </a:solidFill>
+                      <a:prstDash val="solid"/>
+                      <a:round/>
+                      <a:headEnd type="none" w="med" len="med"/>
+                      <a:tailEnd type="none" w="med" len="med"/>
+                    </a:lnT>
+                    <a:lnB w="12700" cap="flat" cmpd="sng" algn="ctr">
+                      <a:solidFill>
+                        <a:schemeClr val="tx1"/>
+                      </a:solidFill>
+                      <a:prstDash val="solid"/>
+                      <a:round/>
+                      <a:headEnd type="none" w="med" len="med"/>
+                      <a:tailEnd type="none" w="med" len="med"/>
+                    </a:lnB>
+                    <a:lnTlToBr w="12700" cmpd="sng">
+                      <a:noFill/>
+                      <a:prstDash val="solid"/>
+                    </a:lnTlToBr>
+                    <a:lnBlToTr w="12700" cmpd="sng">
+                      <a:noFill/>
+                      <a:prstDash val="solid"/>
+                    </a:lnBlToTr>
+                    <a:solidFill>
+                      <a:schemeClr val="accent2">
+                        <a:lumMod val="60000"/>
+                        <a:lumOff val="40000"/>
+                      </a:schemeClr>
+                    </a:solidFill>
+                  </a:tcPr>
+                </a:tc>
+                <a:tc>
+                  <a:txBody>
+                    <a:bodyPr/>
+                    <a:lstStyle/>
+                    <a:p>
+                      <a:endParaRPr lang="zh-CN" altLang="en-US"/>
+                    </a:p>
+                  </a:txBody>
+                  <a:tcPr>
+                    <a:lnL w="12700" cap="flat" cmpd="sng" algn="ctr">
+                      <a:solidFill>
+                        <a:schemeClr val="tx1"/>
+                      </a:solidFill>
+                      <a:prstDash val="solid"/>
+                      <a:round/>
+                      <a:headEnd type="none" w="med" len="med"/>
+                      <a:tailEnd type="none" w="med" len="med"/>
+                    </a:lnL>
+                    <a:lnR w="12700" cap="flat" cmpd="sng" algn="ctr">
+                      <a:solidFill>
+                        <a:schemeClr val="tx1"/>
+                      </a:solidFill>
+                      <a:prstDash val="solid"/>
+                      <a:round/>
+                      <a:headEnd type="none" w="med" len="med"/>
+                      <a:tailEnd type="none" w="med" len="med"/>
+                    </a:lnR>
+                    <a:lnT w="12700" cap="flat" cmpd="sng" algn="ctr">
+                      <a:solidFill>
+                        <a:schemeClr val="tx1"/>
+                      </a:solidFill>
+                      <a:prstDash val="solid"/>
+                      <a:round/>
+                      <a:headEnd type="none" w="med" len="med"/>
+                      <a:tailEnd type="none" w="med" len="med"/>
+                    </a:lnT>
+                    <a:lnB w="12700" cap="flat" cmpd="sng" algn="ctr">
+                      <a:solidFill>
+                        <a:schemeClr val="tx1"/>
+                      </a:solidFill>
+                      <a:prstDash val="solid"/>
+                      <a:round/>
+                      <a:headEnd type="none" w="med" len="med"/>
+                      <a:tailEnd type="none" w="med" len="med"/>
+                    </a:lnB>
+                    <a:lnTlToBr w="12700" cmpd="sng">
+                      <a:noFill/>
+                      <a:prstDash val="solid"/>
+                    </a:lnTlToBr>
+                    <a:lnBlToTr w="12700" cmpd="sng">
+                      <a:noFill/>
+                      <a:prstDash val="solid"/>
+                    </a:lnBlToTr>
+                    <a:solidFill>
+                      <a:schemeClr val="bg1">
+                        <a:lumMod val="95000"/>
+                      </a:schemeClr>
+                    </a:solidFill>
+                  </a:tcPr>
+                </a:tc>
+                <a:tc>
+                  <a:txBody>
+                    <a:bodyPr/>
+                    <a:lstStyle/>
+                    <a:p>
+                      <a:endParaRPr lang="zh-CN" altLang="en-US"/>
+                    </a:p>
+                  </a:txBody>
+                  <a:tcPr>
+                    <a:lnL w="12700" cap="flat" cmpd="sng" algn="ctr">
+                      <a:solidFill>
+                        <a:schemeClr val="tx1"/>
+                      </a:solidFill>
+                      <a:prstDash val="solid"/>
+                      <a:round/>
+                      <a:headEnd type="none" w="med" len="med"/>
+                      <a:tailEnd type="none" w="med" len="med"/>
+                    </a:lnL>
+                    <a:lnR w="12700" cap="flat" cmpd="sng" algn="ctr">
+                      <a:solidFill>
+                        <a:schemeClr val="tx1"/>
+                      </a:solidFill>
+                      <a:prstDash val="solid"/>
+                      <a:round/>
+                      <a:headEnd type="none" w="med" len="med"/>
+                      <a:tailEnd type="none" w="med" len="med"/>
+                    </a:lnR>
+                    <a:lnT w="12700" cap="flat" cmpd="sng" algn="ctr">
+                      <a:solidFill>
+                        <a:schemeClr val="tx1"/>
+                      </a:solidFill>
+                      <a:prstDash val="solid"/>
+                      <a:round/>
+                      <a:headEnd type="none" w="med" len="med"/>
+                      <a:tailEnd type="none" w="med" len="med"/>
+                    </a:lnT>
+                    <a:lnB w="12700" cap="flat" cmpd="sng" algn="ctr">
+                      <a:solidFill>
+                        <a:schemeClr val="tx1"/>
+                      </a:solidFill>
+                      <a:prstDash val="solid"/>
+                      <a:round/>
+                      <a:headEnd type="none" w="med" len="med"/>
+                      <a:tailEnd type="none" w="med" len="med"/>
+                    </a:lnB>
+                    <a:lnTlToBr w="12700" cmpd="sng">
+                      <a:noFill/>
+                      <a:prstDash val="solid"/>
+                    </a:lnTlToBr>
+                    <a:lnBlToTr w="12700" cmpd="sng">
+                      <a:noFill/>
+                      <a:prstDash val="solid"/>
+                    </a:lnBlToTr>
+                    <a:solidFill>
+                      <a:schemeClr val="bg1">
+                        <a:lumMod val="95000"/>
+                      </a:schemeClr>
+                    </a:solidFill>
+                  </a:tcPr>
+                </a:tc>
+                <a:tc>
+                  <a:txBody>
+                    <a:bodyPr/>
+                    <a:lstStyle/>
+                    <a:p>
+                      <a:endParaRPr lang="zh-CN" altLang="en-US"/>
+                    </a:p>
+                  </a:txBody>
+                  <a:tcPr>
+                    <a:lnL w="12700" cap="flat" cmpd="sng" algn="ctr">
+                      <a:solidFill>
+                        <a:schemeClr val="tx1"/>
+                      </a:solidFill>
+                      <a:prstDash val="solid"/>
+                      <a:round/>
+                      <a:headEnd type="none" w="med" len="med"/>
+                      <a:tailEnd type="none" w="med" len="med"/>
+                    </a:lnL>
+                    <a:lnR w="12700" cap="flat" cmpd="sng" algn="ctr">
+                      <a:solidFill>
+                        <a:schemeClr val="tx1"/>
+                      </a:solidFill>
+                      <a:prstDash val="solid"/>
+                      <a:round/>
+                      <a:headEnd type="none" w="med" len="med"/>
+                      <a:tailEnd type="none" w="med" len="med"/>
+                    </a:lnR>
+                    <a:lnT w="12700" cap="flat" cmpd="sng" algn="ctr">
+                      <a:solidFill>
+                        <a:schemeClr val="tx1"/>
+                      </a:solidFill>
+                      <a:prstDash val="solid"/>
+                      <a:round/>
+                      <a:headEnd type="none" w="med" len="med"/>
+                      <a:tailEnd type="none" w="med" len="med"/>
+                    </a:lnT>
+                    <a:lnB w="12700" cap="flat" cmpd="sng" algn="ctr">
+                      <a:solidFill>
+                        <a:schemeClr val="tx1"/>
+                      </a:solidFill>
+                      <a:prstDash val="solid"/>
+                      <a:round/>
+                      <a:headEnd type="none" w="med" len="med"/>
+                      <a:tailEnd type="none" w="med" len="med"/>
+                    </a:lnB>
+                    <a:lnTlToBr w="12700" cmpd="sng">
+                      <a:noFill/>
+                      <a:prstDash val="solid"/>
+                    </a:lnTlToBr>
+                    <a:lnBlToTr w="12700" cmpd="sng">
+                      <a:noFill/>
+                      <a:prstDash val="solid"/>
+                    </a:lnBlToTr>
+                    <a:solidFill>
+                      <a:schemeClr val="bg1">
+                        <a:lumMod val="95000"/>
+                      </a:schemeClr>
+                    </a:solidFill>
+                  </a:tcPr>
+                </a:tc>
+                <a:tc>
+                  <a:txBody>
+                    <a:bodyPr/>
+                    <a:lstStyle/>
+                    <a:p>
+                      <a:endParaRPr lang="zh-CN" altLang="en-US"/>
+                    </a:p>
+                  </a:txBody>
+                  <a:tcPr>
+                    <a:lnL w="12700" cap="flat" cmpd="sng" algn="ctr">
+                      <a:solidFill>
+                        <a:schemeClr val="tx1"/>
+                      </a:solidFill>
+                      <a:prstDash val="solid"/>
+                      <a:round/>
+                      <a:headEnd type="none" w="med" len="med"/>
+                      <a:tailEnd type="none" w="med" len="med"/>
+                    </a:lnL>
+                    <a:lnR w="12700" cap="flat" cmpd="sng" algn="ctr">
+                      <a:solidFill>
+                        <a:schemeClr val="tx1"/>
+                      </a:solidFill>
+                      <a:prstDash val="solid"/>
+                      <a:round/>
+                      <a:headEnd type="none" w="med" len="med"/>
+                      <a:tailEnd type="none" w="med" len="med"/>
+                    </a:lnR>
+                    <a:lnT w="12700" cap="flat" cmpd="sng" algn="ctr">
+                      <a:solidFill>
+                        <a:schemeClr val="tx1"/>
+                      </a:solidFill>
+                      <a:prstDash val="solid"/>
+                      <a:round/>
+                      <a:headEnd type="none" w="med" len="med"/>
+                      <a:tailEnd type="none" w="med" len="med"/>
+                    </a:lnT>
+                    <a:lnB w="12700" cap="flat" cmpd="sng" algn="ctr">
+                      <a:solidFill>
+                        <a:schemeClr val="tx1"/>
+                      </a:solidFill>
+                      <a:prstDash val="solid"/>
+                      <a:round/>
+                      <a:headEnd type="none" w="med" len="med"/>
+                      <a:tailEnd type="none" w="med" len="med"/>
+                    </a:lnB>
+                    <a:lnTlToBr w="12700" cmpd="sng">
+                      <a:noFill/>
+                      <a:prstDash val="solid"/>
+                    </a:lnTlToBr>
+                    <a:lnBlToTr w="12700" cmpd="sng">
+                      <a:noFill/>
+                      <a:prstDash val="solid"/>
+                    </a:lnBlToTr>
+                    <a:solidFill>
+                      <a:srgbClr val="00B0F0"/>
+                    </a:solidFill>
+                  </a:tcPr>
+                </a:tc>
+                <a:tc>
+                  <a:txBody>
+                    <a:bodyPr/>
+                    <a:lstStyle/>
+                    <a:p>
+                      <a:endParaRPr lang="zh-CN" altLang="en-US"/>
+                    </a:p>
+                  </a:txBody>
+                  <a:tcPr>
+                    <a:lnL w="12700" cap="flat" cmpd="sng" algn="ctr">
+                      <a:solidFill>
+                        <a:schemeClr val="tx1"/>
+                      </a:solidFill>
+                      <a:prstDash val="solid"/>
+                      <a:round/>
+                      <a:headEnd type="none" w="med" len="med"/>
+                      <a:tailEnd type="none" w="med" len="med"/>
+                    </a:lnL>
+                    <a:lnR w="12700" cap="flat" cmpd="sng" algn="ctr">
+                      <a:solidFill>
+                        <a:schemeClr val="tx1"/>
+                      </a:solidFill>
+                      <a:prstDash val="solid"/>
+                      <a:round/>
+                      <a:headEnd type="none" w="med" len="med"/>
+                      <a:tailEnd type="none" w="med" len="med"/>
+                    </a:lnR>
+                    <a:lnT w="12700" cap="flat" cmpd="sng" algn="ctr">
+                      <a:solidFill>
+                        <a:schemeClr val="tx1"/>
+                      </a:solidFill>
+                      <a:prstDash val="solid"/>
+                      <a:round/>
+                      <a:headEnd type="none" w="med" len="med"/>
+                      <a:tailEnd type="none" w="med" len="med"/>
+                    </a:lnT>
+                    <a:lnB w="12700" cap="flat" cmpd="sng" algn="ctr">
+                      <a:solidFill>
+                        <a:schemeClr val="tx1"/>
+                      </a:solidFill>
+                      <a:prstDash val="solid"/>
+                      <a:round/>
+                      <a:headEnd type="none" w="med" len="med"/>
+                      <a:tailEnd type="none" w="med" len="med"/>
+                    </a:lnB>
+                    <a:lnTlToBr w="12700" cmpd="sng">
+                      <a:noFill/>
+                      <a:prstDash val="solid"/>
+                    </a:lnTlToBr>
+                    <a:lnBlToTr w="12700" cmpd="sng">
+                      <a:noFill/>
+                      <a:prstDash val="solid"/>
+                    </a:lnBlToTr>
+                    <a:solidFill>
+                      <a:schemeClr val="bg1">
+                        <a:lumMod val="95000"/>
+                      </a:schemeClr>
+                    </a:solidFill>
+                  </a:tcPr>
+                </a:tc>
+                <a:tc>
+                  <a:txBody>
+                    <a:bodyPr/>
+                    <a:lstStyle/>
+                    <a:p>
+                      <a:endParaRPr lang="zh-CN" altLang="en-US"/>
+                    </a:p>
+                  </a:txBody>
+                  <a:tcPr>
+                    <a:lnL w="12700" cap="flat" cmpd="sng" algn="ctr">
+                      <a:solidFill>
+                        <a:schemeClr val="tx1"/>
+                      </a:solidFill>
+                      <a:prstDash val="solid"/>
+                      <a:round/>
+                      <a:headEnd type="none" w="med" len="med"/>
+                      <a:tailEnd type="none" w="med" len="med"/>
+                    </a:lnL>
+                    <a:lnR w="12700" cap="flat" cmpd="sng" algn="ctr">
+                      <a:solidFill>
+                        <a:schemeClr val="tx1"/>
+                      </a:solidFill>
+                      <a:prstDash val="solid"/>
+                      <a:round/>
+                      <a:headEnd type="none" w="med" len="med"/>
+                      <a:tailEnd type="none" w="med" len="med"/>
+                    </a:lnR>
+                    <a:lnT w="12700" cap="flat" cmpd="sng" algn="ctr">
+                      <a:solidFill>
+                        <a:schemeClr val="tx1"/>
+                      </a:solidFill>
+                      <a:prstDash val="solid"/>
+                      <a:round/>
+                      <a:headEnd type="none" w="med" len="med"/>
+                      <a:tailEnd type="none" w="med" len="med"/>
+                    </a:lnT>
+                    <a:lnB w="12700" cap="flat" cmpd="sng" algn="ctr">
+                      <a:solidFill>
+                        <a:schemeClr val="tx1"/>
+                      </a:solidFill>
+                      <a:prstDash val="solid"/>
+                      <a:round/>
+                      <a:headEnd type="none" w="med" len="med"/>
+                      <a:tailEnd type="none" w="med" len="med"/>
+                    </a:lnB>
+                    <a:lnTlToBr w="12700" cmpd="sng">
+                      <a:noFill/>
+                      <a:prstDash val="solid"/>
+                    </a:lnTlToBr>
+                    <a:lnBlToTr w="12700" cmpd="sng">
+                      <a:noFill/>
+                      <a:prstDash val="solid"/>
+                    </a:lnBlToTr>
+                    <a:solidFill>
+                      <a:schemeClr val="bg1">
+                        <a:lumMod val="95000"/>
+                      </a:schemeClr>
+                    </a:solidFill>
+                  </a:tcPr>
+                </a:tc>
+                <a:tc>
+                  <a:txBody>
+                    <a:bodyPr/>
+                    <a:lstStyle/>
+                    <a:p>
+                      <a:endParaRPr lang="zh-CN" altLang="en-US"/>
+                    </a:p>
+                  </a:txBody>
+                  <a:tcPr>
+                    <a:lnL w="12700" cap="flat" cmpd="sng" algn="ctr">
+                      <a:solidFill>
+                        <a:schemeClr val="tx1"/>
+                      </a:solidFill>
+                      <a:prstDash val="solid"/>
+                      <a:round/>
+                      <a:headEnd type="none" w="med" len="med"/>
+                      <a:tailEnd type="none" w="med" len="med"/>
+                    </a:lnL>
+                    <a:lnR w="12700" cap="flat" cmpd="sng" algn="ctr">
+                      <a:solidFill>
+                        <a:schemeClr val="tx1"/>
+                      </a:solidFill>
+                      <a:prstDash val="solid"/>
+                      <a:round/>
+                      <a:headEnd type="none" w="med" len="med"/>
+                      <a:tailEnd type="none" w="med" len="med"/>
+                    </a:lnR>
+                    <a:lnT w="12700" cap="flat" cmpd="sng" algn="ctr">
+                      <a:solidFill>
+                        <a:schemeClr val="tx1"/>
+                      </a:solidFill>
+                      <a:prstDash val="solid"/>
+                      <a:round/>
+                      <a:headEnd type="none" w="med" len="med"/>
+                      <a:tailEnd type="none" w="med" len="med"/>
+                    </a:lnT>
+                    <a:lnB w="12700" cap="flat" cmpd="sng" algn="ctr">
+                      <a:solidFill>
+                        <a:schemeClr val="tx1"/>
+                      </a:solidFill>
+                      <a:prstDash val="solid"/>
+                      <a:round/>
+                      <a:headEnd type="none" w="med" len="med"/>
+                      <a:tailEnd type="none" w="med" len="med"/>
+                    </a:lnB>
+                    <a:lnTlToBr w="12700" cmpd="sng">
+                      <a:noFill/>
+                      <a:prstDash val="solid"/>
+                    </a:lnTlToBr>
+                    <a:lnBlToTr w="12700" cmpd="sng">
+                      <a:noFill/>
+                      <a:prstDash val="solid"/>
+                    </a:lnBlToTr>
+                    <a:solidFill>
+                      <a:schemeClr val="accent2">
+                        <a:lumMod val="60000"/>
+                        <a:lumOff val="40000"/>
+                      </a:schemeClr>
+                    </a:solidFill>
+                  </a:tcPr>
+                </a:tc>
+                <a:tc>
+                  <a:txBody>
+                    <a:bodyPr/>
+                    <a:lstStyle/>
+                    <a:p>
+                      <a:endParaRPr lang="zh-CN" altLang="en-US"/>
+                    </a:p>
+                  </a:txBody>
+                  <a:tcPr>
+                    <a:lnL w="12700" cap="flat" cmpd="sng" algn="ctr">
+                      <a:solidFill>
+                        <a:schemeClr val="tx1"/>
+                      </a:solidFill>
+                      <a:prstDash val="solid"/>
+                      <a:round/>
+                      <a:headEnd type="none" w="med" len="med"/>
+                      <a:tailEnd type="none" w="med" len="med"/>
+                    </a:lnL>
+                    <a:lnR w="12700" cap="flat" cmpd="sng" algn="ctr">
+                      <a:solidFill>
+                        <a:schemeClr val="tx1"/>
+                      </a:solidFill>
+                      <a:prstDash val="solid"/>
+                      <a:round/>
+                      <a:headEnd type="none" w="med" len="med"/>
+                      <a:tailEnd type="none" w="med" len="med"/>
+                    </a:lnR>
+                    <a:lnT w="12700" cap="flat" cmpd="sng" algn="ctr">
+                      <a:solidFill>
+                        <a:schemeClr val="tx1"/>
+                      </a:solidFill>
+                      <a:prstDash val="solid"/>
+                      <a:round/>
+                      <a:headEnd type="none" w="med" len="med"/>
+                      <a:tailEnd type="none" w="med" len="med"/>
+                    </a:lnT>
+                    <a:lnB w="12700" cap="flat" cmpd="sng" algn="ctr">
+                      <a:solidFill>
+                        <a:schemeClr val="tx1"/>
+                      </a:solidFill>
+                      <a:prstDash val="solid"/>
+                      <a:round/>
+                      <a:headEnd type="none" w="med" len="med"/>
+                      <a:tailEnd type="none" w="med" len="med"/>
+                    </a:lnB>
+                    <a:lnTlToBr w="12700" cmpd="sng">
+                      <a:noFill/>
+                      <a:prstDash val="solid"/>
+                    </a:lnTlToBr>
+                    <a:lnBlToTr w="12700" cmpd="sng">
+                      <a:noFill/>
+                      <a:prstDash val="solid"/>
+                    </a:lnBlToTr>
+                    <a:solidFill>
+                      <a:schemeClr val="bg1">
+                        <a:lumMod val="95000"/>
+                      </a:schemeClr>
+                    </a:solidFill>
+                  </a:tcPr>
+                </a:tc>
+                <a:tc>
+                  <a:txBody>
+                    <a:bodyPr/>
+                    <a:lstStyle/>
+                    <a:p>
+                      <a:endParaRPr lang="zh-CN" altLang="en-US"/>
+                    </a:p>
+                  </a:txBody>
+                  <a:tcPr>
+                    <a:lnL w="12700" cap="flat" cmpd="sng" algn="ctr">
+                      <a:solidFill>
+                        <a:schemeClr val="tx1"/>
+                      </a:solidFill>
+                      <a:prstDash val="solid"/>
+                      <a:round/>
+                      <a:headEnd type="none" w="med" len="med"/>
+                      <a:tailEnd type="none" w="med" len="med"/>
+                    </a:lnL>
+                    <a:lnR w="12700" cap="flat" cmpd="sng" algn="ctr">
+                      <a:solidFill>
+                        <a:schemeClr val="tx1"/>
+                      </a:solidFill>
+                      <a:prstDash val="solid"/>
+                      <a:round/>
+                      <a:headEnd type="none" w="med" len="med"/>
+                      <a:tailEnd type="none" w="med" len="med"/>
+                    </a:lnR>
+                    <a:lnT w="12700" cap="flat" cmpd="sng" algn="ctr">
+                      <a:solidFill>
+                        <a:schemeClr val="tx1"/>
+                      </a:solidFill>
+                      <a:prstDash val="solid"/>
+                      <a:round/>
+                      <a:headEnd type="none" w="med" len="med"/>
+                      <a:tailEnd type="none" w="med" len="med"/>
+                    </a:lnT>
+                    <a:lnB w="12700" cap="flat" cmpd="sng" algn="ctr">
+                      <a:solidFill>
+                        <a:schemeClr val="tx1"/>
+                      </a:solidFill>
+                      <a:prstDash val="solid"/>
+                      <a:round/>
+                      <a:headEnd type="none" w="med" len="med"/>
+                      <a:tailEnd type="none" w="med" len="med"/>
+                    </a:lnB>
+                    <a:lnTlToBr w="12700" cmpd="sng">
+                      <a:noFill/>
+                      <a:prstDash val="solid"/>
+                    </a:lnTlToBr>
+                    <a:lnBlToTr w="12700" cmpd="sng">
+                      <a:noFill/>
+                      <a:prstDash val="solid"/>
+                    </a:lnBlToTr>
+                    <a:solidFill>
+                      <a:schemeClr val="bg1">
+                        <a:lumMod val="95000"/>
+                      </a:schemeClr>
+                    </a:solidFill>
+                  </a:tcPr>
+                </a:tc>
+                <a:tc>
+                  <a:txBody>
+                    <a:bodyPr/>
+                    <a:lstStyle/>
+                    <a:p>
+                      <a:endParaRPr lang="zh-CN" altLang="en-US"/>
+                    </a:p>
+                  </a:txBody>
+                  <a:tcPr>
+                    <a:lnL w="12700" cap="flat" cmpd="sng" algn="ctr">
+                      <a:solidFill>
+                        <a:schemeClr val="tx1"/>
+                      </a:solidFill>
+                      <a:prstDash val="solid"/>
+                      <a:round/>
+                      <a:headEnd type="none" w="med" len="med"/>
+                      <a:tailEnd type="none" w="med" len="med"/>
+                    </a:lnL>
+                    <a:lnR w="12700" cap="flat" cmpd="sng" algn="ctr">
+                      <a:solidFill>
+                        <a:schemeClr val="tx1"/>
+                      </a:solidFill>
+                      <a:prstDash val="solid"/>
+                      <a:round/>
+                      <a:headEnd type="none" w="med" len="med"/>
+                      <a:tailEnd type="none" w="med" len="med"/>
+                    </a:lnR>
+                    <a:lnT w="12700" cap="flat" cmpd="sng" algn="ctr">
+                      <a:solidFill>
+                        <a:schemeClr val="tx1"/>
+                      </a:solidFill>
+                      <a:prstDash val="solid"/>
+                      <a:round/>
+                      <a:headEnd type="none" w="med" len="med"/>
+                      <a:tailEnd type="none" w="med" len="med"/>
+                    </a:lnT>
+                    <a:lnB w="12700" cap="flat" cmpd="sng" algn="ctr">
+                      <a:solidFill>
+                        <a:schemeClr val="tx1"/>
+                      </a:solidFill>
+                      <a:prstDash val="solid"/>
+                      <a:round/>
+                      <a:headEnd type="none" w="med" len="med"/>
+                      <a:tailEnd type="none" w="med" len="med"/>
+                    </a:lnB>
+                    <a:lnTlToBr w="12700" cmpd="sng">
+                      <a:noFill/>
+                      <a:prstDash val="solid"/>
+                    </a:lnTlToBr>
+                    <a:lnBlToTr w="12700" cmpd="sng">
+                      <a:noFill/>
+                      <a:prstDash val="solid"/>
+                    </a:lnBlToTr>
+                    <a:solidFill>
+                      <a:schemeClr val="bg1">
+                        <a:lumMod val="95000"/>
+                      </a:schemeClr>
+                    </a:solidFill>
+                  </a:tcPr>
+                </a:tc>
+                <a:tc>
+                  <a:txBody>
+                    <a:bodyPr/>
+                    <a:lstStyle/>
+                    <a:p>
+                      <a:endParaRPr lang="zh-CN" altLang="en-US"/>
+                    </a:p>
+                  </a:txBody>
+                  <a:tcPr>
+                    <a:lnL w="12700" cap="flat" cmpd="sng" algn="ctr">
+                      <a:solidFill>
+                        <a:schemeClr val="tx1"/>
+                      </a:solidFill>
+                      <a:prstDash val="solid"/>
+                      <a:round/>
+                      <a:headEnd type="none" w="med" len="med"/>
+                      <a:tailEnd type="none" w="med" len="med"/>
+                    </a:lnL>
+                    <a:lnR w="12700" cap="flat" cmpd="sng" algn="ctr">
+                      <a:solidFill>
+                        <a:schemeClr val="tx1"/>
+                      </a:solidFill>
+                      <a:prstDash val="solid"/>
+                      <a:round/>
+                      <a:headEnd type="none" w="med" len="med"/>
+                      <a:tailEnd type="none" w="med" len="med"/>
+                    </a:lnR>
+                    <a:lnT w="12700" cap="flat" cmpd="sng" algn="ctr">
+                      <a:solidFill>
+                        <a:schemeClr val="tx1"/>
+                      </a:solidFill>
+                      <a:prstDash val="solid"/>
+                      <a:round/>
+                      <a:headEnd type="none" w="med" len="med"/>
+                      <a:tailEnd type="none" w="med" len="med"/>
+                    </a:lnT>
+                    <a:lnB w="12700" cap="flat" cmpd="sng" algn="ctr">
+                      <a:solidFill>
+                        <a:schemeClr val="tx1"/>
+                      </a:solidFill>
+                      <a:prstDash val="solid"/>
+                      <a:round/>
+                      <a:headEnd type="none" w="med" len="med"/>
+                      <a:tailEnd type="none" w="med" len="med"/>
+                    </a:lnB>
+                    <a:lnTlToBr w="12700" cmpd="sng">
+                      <a:noFill/>
+                      <a:prstDash val="solid"/>
+                    </a:lnTlToBr>
+                    <a:lnBlToTr w="12700" cmpd="sng">
+                      <a:noFill/>
+                      <a:prstDash val="solid"/>
+                    </a:lnBlToTr>
+                    <a:solidFill>
+                      <a:schemeClr val="bg1">
+                        <a:lumMod val="95000"/>
+                      </a:schemeClr>
+                    </a:solidFill>
+                  </a:tcPr>
+                </a:tc>
+                <a:tc>
+                  <a:txBody>
+                    <a:bodyPr/>
+                    <a:lstStyle/>
+                    <a:p>
+                      <a:endParaRPr lang="zh-CN" altLang="en-US"/>
+                    </a:p>
+                  </a:txBody>
+                  <a:tcPr>
+                    <a:lnL w="12700" cap="flat" cmpd="sng" algn="ctr">
+                      <a:solidFill>
+                        <a:schemeClr val="tx1"/>
+                      </a:solidFill>
+                      <a:prstDash val="solid"/>
+                      <a:round/>
+                      <a:headEnd type="none" w="med" len="med"/>
+                      <a:tailEnd type="none" w="med" len="med"/>
+                    </a:lnL>
+                    <a:lnR w="12700" cap="flat" cmpd="sng" algn="ctr">
+                      <a:solidFill>
+                        <a:schemeClr val="tx1"/>
+                      </a:solidFill>
+                      <a:prstDash val="solid"/>
+                      <a:round/>
+                      <a:headEnd type="none" w="med" len="med"/>
+                      <a:tailEnd type="none" w="med" len="med"/>
+                    </a:lnR>
+                    <a:lnT w="12700" cap="flat" cmpd="sng" algn="ctr">
+                      <a:solidFill>
+                        <a:schemeClr val="tx1"/>
+                      </a:solidFill>
+                      <a:prstDash val="solid"/>
+                      <a:round/>
+                      <a:headEnd type="none" w="med" len="med"/>
+                      <a:tailEnd type="none" w="med" len="med"/>
+                    </a:lnT>
+                    <a:lnB w="12700" cap="flat" cmpd="sng" algn="ctr">
+                      <a:solidFill>
+                        <a:schemeClr val="tx1"/>
+                      </a:solidFill>
+                      <a:prstDash val="solid"/>
+                      <a:round/>
+                      <a:headEnd type="none" w="med" len="med"/>
+                      <a:tailEnd type="none" w="med" len="med"/>
+                    </a:lnB>
+                    <a:lnTlToBr w="12700" cmpd="sng">
+                      <a:noFill/>
+                      <a:prstDash val="solid"/>
+                    </a:lnTlToBr>
+                    <a:lnBlToTr w="12700" cmpd="sng">
+                      <a:noFill/>
+                      <a:prstDash val="solid"/>
+                    </a:lnBlToTr>
+                    <a:solidFill>
+                      <a:schemeClr val="bg1">
+                        <a:lumMod val="95000"/>
+                      </a:schemeClr>
+                    </a:solidFill>
+                  </a:tcPr>
+                </a:tc>
+                <a:tc>
+                  <a:txBody>
+                    <a:bodyPr/>
+                    <a:lstStyle/>
+                    <a:p>
+                      <a:endParaRPr lang="zh-CN" altLang="en-US"/>
+                    </a:p>
+                  </a:txBody>
+                  <a:tcPr>
+                    <a:lnL w="12700" cap="flat" cmpd="sng" algn="ctr">
+                      <a:solidFill>
+                        <a:schemeClr val="tx1"/>
+                      </a:solidFill>
+                      <a:prstDash val="solid"/>
+                      <a:round/>
+                      <a:headEnd type="none" w="med" len="med"/>
+                      <a:tailEnd type="none" w="med" len="med"/>
+                    </a:lnL>
+                    <a:lnR w="12700" cap="flat" cmpd="sng" algn="ctr">
+                      <a:solidFill>
+                        <a:schemeClr val="tx1"/>
+                      </a:solidFill>
+                      <a:prstDash val="solid"/>
+                      <a:round/>
+                      <a:headEnd type="none" w="med" len="med"/>
+                      <a:tailEnd type="none" w="med" len="med"/>
+                    </a:lnR>
+                    <a:lnT w="12700" cap="flat" cmpd="sng" algn="ctr">
+                      <a:solidFill>
+                        <a:schemeClr val="tx1"/>
+                      </a:solidFill>
+                      <a:prstDash val="solid"/>
+                      <a:round/>
+                      <a:headEnd type="none" w="med" len="med"/>
+                      <a:tailEnd type="none" w="med" len="med"/>
+                    </a:lnT>
+                    <a:lnB w="12700" cap="flat" cmpd="sng" algn="ctr">
+                      <a:solidFill>
+                        <a:schemeClr val="tx1"/>
+                      </a:solidFill>
+                      <a:prstDash val="solid"/>
+                      <a:round/>
+                      <a:headEnd type="none" w="med" len="med"/>
+                      <a:tailEnd type="none" w="med" len="med"/>
+                    </a:lnB>
+                    <a:lnTlToBr w="12700" cmpd="sng">
+                      <a:noFill/>
+                      <a:prstDash val="solid"/>
+                    </a:lnTlToBr>
+                    <a:lnBlToTr w="12700" cmpd="sng">
+                      <a:noFill/>
+                      <a:prstDash val="solid"/>
+                    </a:lnBlToTr>
+                    <a:solidFill>
+                      <a:schemeClr val="bg1">
+                        <a:lumMod val="95000"/>
+                      </a:schemeClr>
+                    </a:solidFill>
+                  </a:tcPr>
+                </a:tc>
+                <a:tc>
+                  <a:txBody>
+                    <a:bodyPr/>
+                    <a:lstStyle/>
+                    <a:p>
+                      <a:endParaRPr lang="zh-CN" altLang="en-US"/>
+                    </a:p>
+                  </a:txBody>
+                  <a:tcPr>
+                    <a:lnL w="12700" cap="flat" cmpd="sng" algn="ctr">
+                      <a:solidFill>
+                        <a:schemeClr val="tx1"/>
+                      </a:solidFill>
+                      <a:prstDash val="solid"/>
+                      <a:round/>
+                      <a:headEnd type="none" w="med" len="med"/>
+                      <a:tailEnd type="none" w="med" len="med"/>
+                    </a:lnL>
+                    <a:lnR w="12700" cap="flat" cmpd="sng" algn="ctr">
+                      <a:solidFill>
+                        <a:schemeClr val="tx1"/>
+                      </a:solidFill>
+                      <a:prstDash val="solid"/>
+                      <a:round/>
+                      <a:headEnd type="none" w="med" len="med"/>
+                      <a:tailEnd type="none" w="med" len="med"/>
+                    </a:lnR>
+                    <a:lnT w="12700" cap="flat" cmpd="sng" algn="ctr">
+                      <a:solidFill>
+                        <a:schemeClr val="tx1"/>
+                      </a:solidFill>
+                      <a:prstDash val="solid"/>
+                      <a:round/>
+                      <a:headEnd type="none" w="med" len="med"/>
+                      <a:tailEnd type="none" w="med" len="med"/>
+                    </a:lnT>
+                    <a:lnB w="12700" cap="flat" cmpd="sng" algn="ctr">
+                      <a:solidFill>
+                        <a:schemeClr val="tx1"/>
+                      </a:solidFill>
+                      <a:prstDash val="solid"/>
+                      <a:round/>
+                      <a:headEnd type="none" w="med" len="med"/>
+                      <a:tailEnd type="none" w="med" len="med"/>
+                    </a:lnB>
+                    <a:lnTlToBr w="12700" cmpd="sng">
+                      <a:noFill/>
+                      <a:prstDash val="solid"/>
+                    </a:lnTlToBr>
+                    <a:lnBlToTr w="12700" cmpd="sng">
+                      <a:noFill/>
+                      <a:prstDash val="solid"/>
+                    </a:lnBlToTr>
+                    <a:solidFill>
+                      <a:schemeClr val="accent2">
+                        <a:lumMod val="60000"/>
+                        <a:lumOff val="40000"/>
+                      </a:schemeClr>
+                    </a:solidFill>
+                  </a:tcPr>
+                </a:tc>
+                <a:tc>
+                  <a:txBody>
+                    <a:bodyPr/>
+                    <a:lstStyle/>
+                    <a:p>
+                      <a:endParaRPr lang="zh-CN" altLang="en-US"/>
+                    </a:p>
+                  </a:txBody>
+                  <a:tcPr>
+                    <a:lnL w="12700" cap="flat" cmpd="sng" algn="ctr">
+                      <a:solidFill>
+                        <a:schemeClr val="tx1"/>
+                      </a:solidFill>
+                      <a:prstDash val="solid"/>
+                      <a:round/>
+                      <a:headEnd type="none" w="med" len="med"/>
+                      <a:tailEnd type="none" w="med" len="med"/>
+                    </a:lnL>
+                    <a:lnR w="12700" cap="flat" cmpd="sng" algn="ctr">
+                      <a:solidFill>
+                        <a:schemeClr val="tx1"/>
+                      </a:solidFill>
+                      <a:prstDash val="solid"/>
+                      <a:round/>
+                      <a:headEnd type="none" w="med" len="med"/>
+                      <a:tailEnd type="none" w="med" len="med"/>
+                    </a:lnR>
+                    <a:lnT w="12700" cap="flat" cmpd="sng" algn="ctr">
+                      <a:solidFill>
+                        <a:schemeClr val="tx1"/>
+                      </a:solidFill>
+                      <a:prstDash val="solid"/>
+                      <a:round/>
+                      <a:headEnd type="none" w="med" len="med"/>
+                      <a:tailEnd type="none" w="med" len="med"/>
+                    </a:lnT>
+                    <a:lnB w="12700" cap="flat" cmpd="sng" algn="ctr">
+                      <a:solidFill>
+                        <a:schemeClr val="tx1"/>
+                      </a:solidFill>
+                      <a:prstDash val="solid"/>
+                      <a:round/>
+                      <a:headEnd type="none" w="med" len="med"/>
+                      <a:tailEnd type="none" w="med" len="med"/>
+                    </a:lnB>
+                    <a:lnTlToBr w="12700" cmpd="sng">
+                      <a:noFill/>
+                      <a:prstDash val="solid"/>
+                    </a:lnTlToBr>
+                    <a:lnBlToTr w="12700" cmpd="sng">
+                      <a:noFill/>
+                      <a:prstDash val="solid"/>
+                    </a:lnBlToTr>
+                    <a:solidFill>
+                      <a:schemeClr val="bg1">
+                        <a:lumMod val="95000"/>
+                      </a:schemeClr>
+                    </a:solidFill>
+                  </a:tcPr>
+                </a:tc>
+                <a:tc>
+                  <a:txBody>
+                    <a:bodyPr/>
+                    <a:lstStyle/>
+                    <a:p>
+                      <a:endParaRPr lang="zh-CN" altLang="en-US"/>
+                    </a:p>
+                  </a:txBody>
+                  <a:tcPr>
+                    <a:lnL w="12700" cap="flat" cmpd="sng" algn="ctr">
+                      <a:solidFill>
+                        <a:schemeClr val="tx1"/>
+                      </a:solidFill>
+                      <a:prstDash val="solid"/>
+                      <a:round/>
+                      <a:headEnd type="none" w="med" len="med"/>
+                      <a:tailEnd type="none" w="med" len="med"/>
+                    </a:lnL>
+                    <a:lnR w="12700" cap="flat" cmpd="sng" algn="ctr">
+                      <a:solidFill>
+                        <a:schemeClr val="tx1"/>
+                      </a:solidFill>
+                      <a:prstDash val="solid"/>
+                      <a:round/>
+                      <a:headEnd type="none" w="med" len="med"/>
+                      <a:tailEnd type="none" w="med" len="med"/>
+                    </a:lnR>
+                    <a:lnT w="12700" cap="flat" cmpd="sng" algn="ctr">
+                      <a:solidFill>
+                        <a:schemeClr val="tx1"/>
+                      </a:solidFill>
+                      <a:prstDash val="solid"/>
+                      <a:round/>
+                      <a:headEnd type="none" w="med" len="med"/>
+                      <a:tailEnd type="none" w="med" len="med"/>
+                    </a:lnT>
+                    <a:lnB w="12700" cap="flat" cmpd="sng" algn="ctr">
+                      <a:solidFill>
+                        <a:schemeClr val="tx1"/>
+                      </a:solidFill>
+                      <a:prstDash val="solid"/>
+                      <a:round/>
+                      <a:headEnd type="none" w="med" len="med"/>
+                      <a:tailEnd type="none" w="med" len="med"/>
+                    </a:lnB>
+                    <a:lnTlToBr w="12700" cmpd="sng">
+                      <a:noFill/>
+                      <a:prstDash val="solid"/>
+                    </a:lnTlToBr>
+                    <a:lnBlToTr w="12700" cmpd="sng">
+                      <a:noFill/>
+                      <a:prstDash val="solid"/>
+                    </a:lnBlToTr>
+                    <a:solidFill>
+                      <a:srgbClr val="00B0F0"/>
+                    </a:solidFill>
+                  </a:tcPr>
+                </a:tc>
+                <a:tc>
+                  <a:txBody>
+                    <a:bodyPr/>
+                    <a:lstStyle/>
+                    <a:p>
+                      <a:endParaRPr lang="zh-CN" altLang="en-US"/>
+                    </a:p>
+                  </a:txBody>
+                  <a:tcPr>
+                    <a:lnL w="12700" cap="flat" cmpd="sng" algn="ctr">
+                      <a:solidFill>
+                        <a:schemeClr val="tx1"/>
+                      </a:solidFill>
+                      <a:prstDash val="solid"/>
+                      <a:round/>
+                      <a:headEnd type="none" w="med" len="med"/>
+                      <a:tailEnd type="none" w="med" len="med"/>
+                    </a:lnL>
+                    <a:lnR w="12700" cap="flat" cmpd="sng" algn="ctr">
+                      <a:solidFill>
+                        <a:schemeClr val="tx1"/>
+                      </a:solidFill>
+                      <a:prstDash val="solid"/>
+                      <a:round/>
+                      <a:headEnd type="none" w="med" len="med"/>
+                      <a:tailEnd type="none" w="med" len="med"/>
+                    </a:lnR>
+                    <a:lnT w="12700" cap="flat" cmpd="sng" algn="ctr">
+                      <a:solidFill>
+                        <a:schemeClr val="tx1"/>
+                      </a:solidFill>
+                      <a:prstDash val="solid"/>
+                      <a:round/>
+                      <a:headEnd type="none" w="med" len="med"/>
+                      <a:tailEnd type="none" w="med" len="med"/>
+                    </a:lnT>
+                    <a:lnB w="12700" cap="flat" cmpd="sng" algn="ctr">
+                      <a:solidFill>
+                        <a:schemeClr val="tx1"/>
+                      </a:solidFill>
+                      <a:prstDash val="solid"/>
+                      <a:round/>
+                      <a:headEnd type="none" w="med" len="med"/>
+                      <a:tailEnd type="none" w="med" len="med"/>
+                    </a:lnB>
+                    <a:lnTlToBr w="12700" cmpd="sng">
+                      <a:noFill/>
+                      <a:prstDash val="solid"/>
+                    </a:lnTlToBr>
+                    <a:lnBlToTr w="12700" cmpd="sng">
+                      <a:noFill/>
+                      <a:prstDash val="solid"/>
+                    </a:lnBlToTr>
+                    <a:solidFill>
+                      <a:schemeClr val="bg1">
+                        <a:lumMod val="95000"/>
+                      </a:schemeClr>
+                    </a:solidFill>
+                  </a:tcPr>
+                </a:tc>
+                <a:tc>
+                  <a:txBody>
+                    <a:bodyPr/>
+                    <a:lstStyle/>
+                    <a:p>
+                      <a:endParaRPr lang="zh-CN" altLang="en-US"/>
+                    </a:p>
+                  </a:txBody>
+                  <a:tcPr>
+                    <a:lnL w="12700" cap="flat" cmpd="sng" algn="ctr">
+                      <a:solidFill>
+                        <a:schemeClr val="tx1"/>
+                      </a:solidFill>
+                      <a:prstDash val="solid"/>
+                      <a:round/>
+                      <a:headEnd type="none" w="med" len="med"/>
+                      <a:tailEnd type="none" w="med" len="med"/>
+                    </a:lnL>
+                    <a:lnR w="12700" cap="flat" cmpd="sng" algn="ctr">
+                      <a:solidFill>
+                        <a:schemeClr val="tx1"/>
+                      </a:solidFill>
+                      <a:prstDash val="solid"/>
+                      <a:round/>
+                      <a:headEnd type="none" w="med" len="med"/>
+                      <a:tailEnd type="none" w="med" len="med"/>
+                    </a:lnR>
+                    <a:lnT w="12700" cap="flat" cmpd="sng" algn="ctr">
+                      <a:solidFill>
+                        <a:schemeClr val="tx1"/>
+                      </a:solidFill>
+                      <a:prstDash val="solid"/>
+                      <a:round/>
+                      <a:headEnd type="none" w="med" len="med"/>
+                      <a:tailEnd type="none" w="med" len="med"/>
+                    </a:lnT>
+                    <a:lnB w="12700" cap="flat" cmpd="sng" algn="ctr">
+                      <a:solidFill>
+                        <a:schemeClr val="tx1"/>
+                      </a:solidFill>
+                      <a:prstDash val="solid"/>
+                      <a:round/>
+                      <a:headEnd type="none" w="med" len="med"/>
+                      <a:tailEnd type="none" w="med" len="med"/>
+                    </a:lnB>
+                    <a:lnTlToBr w="12700" cmpd="sng">
+                      <a:noFill/>
+                      <a:prstDash val="solid"/>
+                    </a:lnTlToBr>
+                    <a:lnBlToTr w="12700" cmpd="sng">
+                      <a:noFill/>
+                      <a:prstDash val="solid"/>
+                    </a:lnBlToTr>
+                    <a:solidFill>
+                      <a:schemeClr val="bg1">
+                        <a:lumMod val="95000"/>
+                      </a:schemeClr>
+                    </a:solidFill>
+                  </a:tcPr>
+                </a:tc>
+              </a:tr>
+            </a:tbl>
+          </a:graphicData>
+        </a:graphic>
+      </p:graphicFrame>
+      <p:sp>
+        <p:nvSpPr>
+          <p:cNvPr id="28" name="云形 27"/>
+          <p:cNvSpPr/>
+          <p:nvPr/>
+        </p:nvSpPr>
+        <p:spPr>
+          <a:xfrm>
+            <a:off x="1698458" y="2855493"/>
+            <a:ext cx="1348154" cy="738554"/>
+          </a:xfrm>
+          <a:prstGeom prst="cloud">
+            <a:avLst/>
+          </a:prstGeom>
+          <a:solidFill>
+            <a:schemeClr val="accent2"/>
+          </a:solidFill>
+          <a:ln>
+            <a:noFill/>
+          </a:ln>
+        </p:spPr>
+        <p:style>
+          <a:lnRef idx="2">
+            <a:schemeClr val="accent1">
+              <a:shade val="50000"/>
+            </a:schemeClr>
+          </a:lnRef>
+          <a:fillRef idx="1">
+            <a:schemeClr val="accent1"/>
+          </a:fillRef>
+          <a:effectRef idx="0">
+            <a:schemeClr val="accent1"/>
+          </a:effectRef>
+          <a:fontRef idx="minor">
+            <a:schemeClr val="lt1"/>
+          </a:fontRef>
+        </p:style>
+        <p:txBody>
+          <a:bodyPr rtlCol="0" anchor="ctr"/>
+          <a:lstStyle/>
+          <a:p>
+            <a:pPr algn="ctr"/>
+            <a:r>
+              <a:rPr kumimoji="1" lang="zh-CN" altLang="en-US"/>
+              <a:t>集合</a:t>
+            </a:r>
+            <a:r>
+              <a:rPr kumimoji="1" lang="en-US" altLang="zh-CN"/>
+              <a:t>S1</a:t>
+            </a:r>
+            <a:endParaRPr kumimoji="1" lang="zh-CN" altLang="en-US"/>
+          </a:p>
+        </p:txBody>
+      </p:sp>
+      <p:sp>
+        <p:nvSpPr>
+          <p:cNvPr id="30" name="云形 29"/>
+          <p:cNvSpPr/>
+          <p:nvPr/>
+        </p:nvSpPr>
+        <p:spPr>
+          <a:xfrm>
+            <a:off x="5800658" y="2855493"/>
+            <a:ext cx="1348154" cy="738554"/>
+          </a:xfrm>
+          <a:prstGeom prst="cloud">
+            <a:avLst/>
+          </a:prstGeom>
+          <a:ln>
+            <a:noFill/>
+          </a:ln>
+        </p:spPr>
+        <p:style>
+          <a:lnRef idx="2">
+            <a:schemeClr val="accent1">
+              <a:shade val="50000"/>
+            </a:schemeClr>
+          </a:lnRef>
+          <a:fillRef idx="1">
+            <a:schemeClr val="accent1"/>
+          </a:fillRef>
+          <a:effectRef idx="0">
+            <a:schemeClr val="accent1"/>
+          </a:effectRef>
+          <a:fontRef idx="minor">
+            <a:schemeClr val="lt1"/>
+          </a:fontRef>
+        </p:style>
+        <p:txBody>
+          <a:bodyPr rtlCol="0" anchor="ctr"/>
+          <a:lstStyle/>
+          <a:p>
+            <a:pPr algn="ctr"/>
+            <a:r>
+              <a:rPr kumimoji="1" lang="zh-CN" altLang="en-US"/>
+              <a:t>集合</a:t>
+            </a:r>
+            <a:r>
+              <a:rPr kumimoji="1" lang="en-US" altLang="zh-CN"/>
+              <a:t>S2</a:t>
+            </a:r>
+            <a:endParaRPr kumimoji="1" lang="zh-CN" altLang="en-US"/>
+          </a:p>
+        </p:txBody>
+      </p:sp>
+      <p:grpSp>
+        <p:nvGrpSpPr>
+          <p:cNvPr id="32" name="组 31"/>
+          <p:cNvGrpSpPr/>
+          <p:nvPr/>
+        </p:nvGrpSpPr>
+        <p:grpSpPr>
+          <a:xfrm>
+            <a:off x="2780887" y="3732767"/>
+            <a:ext cx="360000" cy="461665"/>
+            <a:chOff x="4947138" y="1808258"/>
+            <a:chExt cx="360000" cy="461665"/>
+          </a:xfrm>
+        </p:grpSpPr>
+        <p:sp>
+          <p:nvSpPr>
+            <p:cNvPr id="33" name="椭圆 32"/>
+            <p:cNvSpPr/>
+            <p:nvPr/>
+          </p:nvSpPr>
+          <p:spPr>
+            <a:xfrm>
+              <a:off x="4947138" y="1887928"/>
+              <a:ext cx="360000" cy="360000"/>
+            </a:xfrm>
+            <a:prstGeom prst="ellipse">
+              <a:avLst/>
+            </a:prstGeom>
+            <a:solidFill>
+              <a:srgbClr val="00B050"/>
+            </a:solidFill>
+            <a:ln>
+              <a:noFill/>
+            </a:ln>
+          </p:spPr>
+          <p:style>
+            <a:lnRef idx="2">
+              <a:schemeClr val="accent1">
+                <a:shade val="50000"/>
+              </a:schemeClr>
+            </a:lnRef>
+            <a:fillRef idx="1">
+              <a:schemeClr val="accent1"/>
+            </a:fillRef>
+            <a:effectRef idx="0">
+              <a:schemeClr val="accent1"/>
+            </a:effectRef>
+            <a:fontRef idx="minor">
+              <a:schemeClr val="lt1"/>
+            </a:fontRef>
+          </p:style>
+          <p:txBody>
+            <a:bodyPr rtlCol="0" anchor="ctr"/>
+            <a:lstStyle/>
+            <a:p>
+              <a:pPr algn="ctr"/>
+              <a:endParaRPr kumimoji="1" lang="zh-CN" altLang="en-US"/>
+            </a:p>
+          </p:txBody>
+        </p:sp>
+        <p:sp>
+          <p:nvSpPr>
+            <p:cNvPr id="35" name="文本框 34"/>
+            <p:cNvSpPr txBox="1"/>
+            <p:nvPr/>
+          </p:nvSpPr>
+          <p:spPr>
+            <a:xfrm>
+              <a:off x="4952678" y="1808258"/>
+              <a:ext cx="343364" cy="461665"/>
+            </a:xfrm>
+            <a:prstGeom prst="rect">
+              <a:avLst/>
+            </a:prstGeom>
+            <a:noFill/>
+          </p:spPr>
+          <p:txBody>
+            <a:bodyPr wrap="none" rtlCol="0">
+              <a:spAutoFit/>
+            </a:bodyPr>
+            <a:lstStyle/>
+            <a:p>
+              <a:r>
+                <a:rPr kumimoji="1" lang="en-US" altLang="zh-CN" sz="2400">
+                  <a:solidFill>
+                    <a:schemeClr val="bg1"/>
+                  </a:solidFill>
+                </a:rPr>
+                <a:t>e</a:t>
+              </a:r>
+              <a:endParaRPr kumimoji="1" lang="zh-CN" altLang="en-US" sz="2400">
+                <a:solidFill>
+                  <a:schemeClr val="bg1"/>
+                </a:solidFill>
+              </a:endParaRPr>
+            </a:p>
+          </p:txBody>
+        </p:sp>
+      </p:grpSp>
+      <p:grpSp>
+        <p:nvGrpSpPr>
+          <p:cNvPr id="36" name="组 35"/>
+          <p:cNvGrpSpPr/>
+          <p:nvPr/>
+        </p:nvGrpSpPr>
+        <p:grpSpPr>
+          <a:xfrm>
+            <a:off x="5620658" y="3732767"/>
+            <a:ext cx="360000" cy="461665"/>
+            <a:chOff x="4947138" y="1808258"/>
+            <a:chExt cx="360000" cy="461665"/>
+          </a:xfrm>
+        </p:grpSpPr>
+        <p:sp>
+          <p:nvSpPr>
+            <p:cNvPr id="38" name="椭圆 37"/>
+            <p:cNvSpPr/>
+            <p:nvPr/>
+          </p:nvSpPr>
+          <p:spPr>
+            <a:xfrm>
+              <a:off x="4947138" y="1887928"/>
+              <a:ext cx="360000" cy="360000"/>
+            </a:xfrm>
+            <a:prstGeom prst="ellipse">
+              <a:avLst/>
+            </a:prstGeom>
+            <a:solidFill>
+              <a:srgbClr val="00B050"/>
+            </a:solidFill>
+            <a:ln>
+              <a:noFill/>
+            </a:ln>
+          </p:spPr>
+          <p:style>
+            <a:lnRef idx="2">
+              <a:schemeClr val="accent1">
+                <a:shade val="50000"/>
+              </a:schemeClr>
+            </a:lnRef>
+            <a:fillRef idx="1">
+              <a:schemeClr val="accent1"/>
+            </a:fillRef>
+            <a:effectRef idx="0">
+              <a:schemeClr val="accent1"/>
+            </a:effectRef>
+            <a:fontRef idx="minor">
+              <a:schemeClr val="lt1"/>
+            </a:fontRef>
+          </p:style>
+          <p:txBody>
+            <a:bodyPr rtlCol="0" anchor="ctr"/>
+            <a:lstStyle/>
+            <a:p>
+              <a:pPr algn="ctr"/>
+              <a:endParaRPr kumimoji="1" lang="zh-CN" altLang="en-US"/>
+            </a:p>
+          </p:txBody>
+        </p:sp>
+        <p:sp>
+          <p:nvSpPr>
+            <p:cNvPr id="39" name="文本框 38"/>
+            <p:cNvSpPr txBox="1"/>
+            <p:nvPr/>
+          </p:nvSpPr>
+          <p:spPr>
+            <a:xfrm>
+              <a:off x="4952678" y="1808258"/>
+              <a:ext cx="343364" cy="461665"/>
+            </a:xfrm>
+            <a:prstGeom prst="rect">
+              <a:avLst/>
+            </a:prstGeom>
+            <a:noFill/>
+          </p:spPr>
+          <p:txBody>
+            <a:bodyPr wrap="none" rtlCol="0">
+              <a:spAutoFit/>
+            </a:bodyPr>
+            <a:lstStyle/>
+            <a:p>
+              <a:r>
+                <a:rPr kumimoji="1" lang="en-US" altLang="zh-CN" sz="2400">
+                  <a:solidFill>
+                    <a:schemeClr val="bg1"/>
+                  </a:solidFill>
+                </a:rPr>
+                <a:t>e</a:t>
+              </a:r>
+              <a:endParaRPr kumimoji="1" lang="zh-CN" altLang="en-US" sz="2400">
+                <a:solidFill>
+                  <a:schemeClr val="bg1"/>
+                </a:solidFill>
+              </a:endParaRPr>
+            </a:p>
+          </p:txBody>
+        </p:sp>
+      </p:grpSp>
+      <p:cxnSp>
+        <p:nvCxnSpPr>
+          <p:cNvPr id="16" name="直线箭头连接符 15"/>
+          <p:cNvCxnSpPr/>
+          <p:nvPr/>
+        </p:nvCxnSpPr>
+        <p:spPr>
+          <a:xfrm>
+            <a:off x="2719010" y="3499491"/>
+            <a:ext cx="222100" cy="327832"/>
+          </a:xfrm>
+          <a:prstGeom prst="straightConnector1">
+            <a:avLst/>
+          </a:prstGeom>
+          <a:ln w="19050">
+            <a:solidFill>
+              <a:schemeClr val="tx1"/>
+            </a:solidFill>
+            <a:tailEnd type="triangle"/>
+          </a:ln>
+        </p:spPr>
+        <p:style>
+          <a:lnRef idx="1">
+            <a:schemeClr val="accent1"/>
+          </a:lnRef>
+          <a:fillRef idx="0">
+            <a:schemeClr val="accent1"/>
+          </a:fillRef>
+          <a:effectRef idx="0">
+            <a:schemeClr val="accent1"/>
+          </a:effectRef>
+          <a:fontRef idx="minor">
+            <a:schemeClr val="tx1"/>
+          </a:fontRef>
+        </p:style>
+      </p:cxnSp>
+      <p:cxnSp>
+        <p:nvCxnSpPr>
+          <p:cNvPr id="40" name="直线箭头连接符 39"/>
+          <p:cNvCxnSpPr/>
+          <p:nvPr/>
+        </p:nvCxnSpPr>
+        <p:spPr>
+          <a:xfrm flipH="1">
+            <a:off x="5889003" y="3514989"/>
+            <a:ext cx="165938" cy="327832"/>
+          </a:xfrm>
+          <a:prstGeom prst="straightConnector1">
+            <a:avLst/>
+          </a:prstGeom>
+          <a:ln w="19050">
+            <a:solidFill>
+              <a:schemeClr val="tx1"/>
+            </a:solidFill>
+            <a:tailEnd type="triangle"/>
+          </a:ln>
+        </p:spPr>
+        <p:style>
+          <a:lnRef idx="1">
+            <a:schemeClr val="accent1"/>
+          </a:lnRef>
+          <a:fillRef idx="0">
+            <a:schemeClr val="accent1"/>
+          </a:fillRef>
+          <a:effectRef idx="0">
+            <a:schemeClr val="accent1"/>
+          </a:effectRef>
+          <a:fontRef idx="minor">
+            <a:schemeClr val="tx1"/>
+          </a:fontRef>
+        </p:style>
+      </p:cxnSp>
+      <p:sp>
+        <p:nvSpPr>
+          <p:cNvPr id="41" name="圆角矩形 40"/>
+          <p:cNvSpPr/>
+          <p:nvPr/>
+        </p:nvSpPr>
+        <p:spPr>
+          <a:xfrm>
+            <a:off x="2013768" y="4499930"/>
+            <a:ext cx="360000" cy="360000"/>
+          </a:xfrm>
+          <a:prstGeom prst="roundRect">
+            <a:avLst/>
+          </a:prstGeom>
+          <a:solidFill>
+            <a:schemeClr val="accent2">
+              <a:lumMod val="60000"/>
+              <a:lumOff val="40000"/>
+            </a:schemeClr>
+          </a:solidFill>
+          <a:ln>
+            <a:noFill/>
+          </a:ln>
+        </p:spPr>
+        <p:style>
+          <a:lnRef idx="2">
+            <a:schemeClr val="accent1">
+              <a:shade val="50000"/>
+            </a:schemeClr>
+          </a:lnRef>
+          <a:fillRef idx="1">
+            <a:schemeClr val="accent1"/>
+          </a:fillRef>
+          <a:effectRef idx="0">
+            <a:schemeClr val="accent1"/>
+          </a:effectRef>
+          <a:fontRef idx="minor">
+            <a:schemeClr val="lt1"/>
+          </a:fontRef>
+        </p:style>
+        <p:txBody>
+          <a:bodyPr rtlCol="0" anchor="ctr"/>
+          <a:lstStyle/>
+          <a:p>
+            <a:pPr algn="ctr"/>
+            <a:r>
+              <a:rPr kumimoji="1" lang="en-US" altLang="zh-CN" sz="1200"/>
+              <a:t>h</a:t>
+            </a:r>
+            <a:r>
+              <a:rPr kumimoji="1" lang="en-US" altLang="zh-CN" sz="1200" baseline="-25000"/>
+              <a:t>1</a:t>
+            </a:r>
+            <a:endParaRPr kumimoji="1" lang="zh-CN" altLang="en-US" sz="1200" baseline="-25000"/>
+          </a:p>
+        </p:txBody>
+      </p:sp>
+      <p:sp>
+        <p:nvSpPr>
+          <p:cNvPr id="42" name="圆角矩形 41"/>
+          <p:cNvSpPr/>
+          <p:nvPr/>
+        </p:nvSpPr>
+        <p:spPr>
+          <a:xfrm>
+            <a:off x="2785370" y="4499930"/>
+            <a:ext cx="360000" cy="360000"/>
+          </a:xfrm>
+          <a:prstGeom prst="roundRect">
+            <a:avLst/>
+          </a:prstGeom>
+          <a:solidFill>
+            <a:schemeClr val="accent2">
+              <a:lumMod val="60000"/>
+              <a:lumOff val="40000"/>
+            </a:schemeClr>
+          </a:solidFill>
+          <a:ln>
+            <a:noFill/>
+          </a:ln>
+        </p:spPr>
+        <p:style>
+          <a:lnRef idx="2">
+            <a:schemeClr val="accent1">
+              <a:shade val="50000"/>
+            </a:schemeClr>
+          </a:lnRef>
+          <a:fillRef idx="1">
+            <a:schemeClr val="accent1"/>
+          </a:fillRef>
+          <a:effectRef idx="0">
+            <a:schemeClr val="accent1"/>
+          </a:effectRef>
+          <a:fontRef idx="minor">
+            <a:schemeClr val="lt1"/>
+          </a:fontRef>
+        </p:style>
+        <p:txBody>
+          <a:bodyPr rtlCol="0" anchor="ctr"/>
+          <a:lstStyle/>
+          <a:p>
+            <a:pPr algn="ctr"/>
+            <a:r>
+              <a:rPr kumimoji="1" lang="en-US" altLang="zh-CN" sz="1200"/>
+              <a:t>h</a:t>
+            </a:r>
+            <a:r>
+              <a:rPr kumimoji="1" lang="en-US" altLang="zh-CN" sz="1200" baseline="-25000"/>
+              <a:t>2</a:t>
+            </a:r>
+            <a:endParaRPr kumimoji="1" lang="zh-CN" altLang="en-US" sz="1200" baseline="-25000"/>
+          </a:p>
+        </p:txBody>
+      </p:sp>
+      <p:sp>
+        <p:nvSpPr>
+          <p:cNvPr id="43" name="圆角矩形 42"/>
+          <p:cNvSpPr/>
+          <p:nvPr/>
+        </p:nvSpPr>
+        <p:spPr>
+          <a:xfrm>
+            <a:off x="3556972" y="4499930"/>
+            <a:ext cx="360000" cy="360000"/>
+          </a:xfrm>
+          <a:prstGeom prst="roundRect">
+            <a:avLst/>
+          </a:prstGeom>
+          <a:solidFill>
+            <a:schemeClr val="accent2">
+              <a:lumMod val="60000"/>
+              <a:lumOff val="40000"/>
+            </a:schemeClr>
+          </a:solidFill>
+          <a:ln>
+            <a:noFill/>
+          </a:ln>
+        </p:spPr>
+        <p:style>
+          <a:lnRef idx="2">
+            <a:schemeClr val="accent1">
+              <a:shade val="50000"/>
+            </a:schemeClr>
+          </a:lnRef>
+          <a:fillRef idx="1">
+            <a:schemeClr val="accent1"/>
+          </a:fillRef>
+          <a:effectRef idx="0">
+            <a:schemeClr val="accent1"/>
+          </a:effectRef>
+          <a:fontRef idx="minor">
+            <a:schemeClr val="lt1"/>
+          </a:fontRef>
+        </p:style>
+        <p:txBody>
+          <a:bodyPr rtlCol="0" anchor="ctr"/>
+          <a:lstStyle/>
+          <a:p>
+            <a:pPr algn="ctr"/>
+            <a:r>
+              <a:rPr kumimoji="1" lang="en-US" altLang="zh-CN" sz="1200"/>
+              <a:t>h</a:t>
+            </a:r>
+            <a:r>
+              <a:rPr kumimoji="1" lang="en-US" altLang="zh-CN" sz="1200" baseline="-25000"/>
+              <a:t>3</a:t>
+            </a:r>
+            <a:endParaRPr kumimoji="1" lang="zh-CN" altLang="en-US" sz="1200" baseline="-25000"/>
+          </a:p>
+        </p:txBody>
+      </p:sp>
+      <p:sp>
+        <p:nvSpPr>
+          <p:cNvPr id="45" name="圆角矩形 44"/>
+          <p:cNvSpPr/>
+          <p:nvPr/>
+        </p:nvSpPr>
+        <p:spPr>
+          <a:xfrm>
+            <a:off x="5334617" y="4494190"/>
+            <a:ext cx="360000" cy="360000"/>
+          </a:xfrm>
+          <a:prstGeom prst="roundRect">
+            <a:avLst/>
+          </a:prstGeom>
+          <a:solidFill>
+            <a:schemeClr val="accent5"/>
+          </a:solidFill>
+          <a:ln>
+            <a:noFill/>
+          </a:ln>
+        </p:spPr>
+        <p:style>
+          <a:lnRef idx="2">
+            <a:schemeClr val="accent1">
+              <a:shade val="50000"/>
+            </a:schemeClr>
+          </a:lnRef>
+          <a:fillRef idx="1">
+            <a:schemeClr val="accent1"/>
+          </a:fillRef>
+          <a:effectRef idx="0">
+            <a:schemeClr val="accent1"/>
+          </a:effectRef>
+          <a:fontRef idx="minor">
+            <a:schemeClr val="lt1"/>
+          </a:fontRef>
+        </p:style>
+        <p:txBody>
+          <a:bodyPr rtlCol="0" anchor="ctr"/>
+          <a:lstStyle/>
+          <a:p>
+            <a:pPr algn="ctr"/>
+            <a:r>
+              <a:rPr kumimoji="1" lang="en-US" altLang="zh-CN" sz="1200"/>
+              <a:t>h</a:t>
+            </a:r>
+            <a:r>
+              <a:rPr kumimoji="1" lang="en-US" altLang="zh-CN" sz="1200" baseline="-25000"/>
+              <a:t>1</a:t>
+            </a:r>
+            <a:endParaRPr kumimoji="1" lang="zh-CN" altLang="en-US" sz="1200" baseline="-25000"/>
+          </a:p>
+        </p:txBody>
+      </p:sp>
+      <p:sp>
+        <p:nvSpPr>
+          <p:cNvPr id="46" name="圆角矩形 45"/>
+          <p:cNvSpPr/>
+          <p:nvPr/>
+        </p:nvSpPr>
+        <p:spPr>
+          <a:xfrm>
+            <a:off x="6106219" y="4494190"/>
+            <a:ext cx="360000" cy="360000"/>
+          </a:xfrm>
+          <a:prstGeom prst="roundRect">
+            <a:avLst/>
+          </a:prstGeom>
+          <a:solidFill>
+            <a:schemeClr val="accent5"/>
+          </a:solidFill>
+          <a:ln>
+            <a:noFill/>
+          </a:ln>
+        </p:spPr>
+        <p:style>
+          <a:lnRef idx="2">
+            <a:schemeClr val="accent1">
+              <a:shade val="50000"/>
+            </a:schemeClr>
+          </a:lnRef>
+          <a:fillRef idx="1">
+            <a:schemeClr val="accent1"/>
+          </a:fillRef>
+          <a:effectRef idx="0">
+            <a:schemeClr val="accent1"/>
+          </a:effectRef>
+          <a:fontRef idx="minor">
+            <a:schemeClr val="lt1"/>
+          </a:fontRef>
+        </p:style>
+        <p:txBody>
+          <a:bodyPr rtlCol="0" anchor="ctr"/>
+          <a:lstStyle/>
+          <a:p>
+            <a:pPr algn="ctr"/>
+            <a:r>
+              <a:rPr kumimoji="1" lang="en-US" altLang="zh-CN" sz="1200"/>
+              <a:t>h</a:t>
+            </a:r>
+            <a:r>
+              <a:rPr kumimoji="1" lang="en-US" altLang="zh-CN" sz="1200" baseline="-25000"/>
+              <a:t>2</a:t>
+            </a:r>
+            <a:endParaRPr kumimoji="1" lang="zh-CN" altLang="en-US" sz="1200" baseline="-25000"/>
+          </a:p>
+        </p:txBody>
+      </p:sp>
+      <p:sp>
+        <p:nvSpPr>
+          <p:cNvPr id="47" name="圆角矩形 46"/>
+          <p:cNvSpPr/>
+          <p:nvPr/>
+        </p:nvSpPr>
+        <p:spPr>
+          <a:xfrm>
+            <a:off x="6877821" y="4494190"/>
+            <a:ext cx="360000" cy="360000"/>
+          </a:xfrm>
+          <a:prstGeom prst="roundRect">
+            <a:avLst/>
+          </a:prstGeom>
+          <a:solidFill>
+            <a:schemeClr val="accent5"/>
+          </a:solidFill>
+          <a:ln>
+            <a:noFill/>
+          </a:ln>
+        </p:spPr>
+        <p:style>
+          <a:lnRef idx="2">
+            <a:schemeClr val="accent1">
+              <a:shade val="50000"/>
+            </a:schemeClr>
+          </a:lnRef>
+          <a:fillRef idx="1">
+            <a:schemeClr val="accent1"/>
+          </a:fillRef>
+          <a:effectRef idx="0">
+            <a:schemeClr val="accent1"/>
+          </a:effectRef>
+          <a:fontRef idx="minor">
+            <a:schemeClr val="lt1"/>
+          </a:fontRef>
+        </p:style>
+        <p:txBody>
+          <a:bodyPr rtlCol="0" anchor="ctr"/>
+          <a:lstStyle/>
+          <a:p>
+            <a:pPr algn="ctr"/>
+            <a:r>
+              <a:rPr kumimoji="1" lang="en-US" altLang="zh-CN" sz="1200"/>
+              <a:t>h</a:t>
+            </a:r>
+            <a:r>
+              <a:rPr kumimoji="1" lang="en-US" altLang="zh-CN" sz="1200" baseline="-25000"/>
+              <a:t>3</a:t>
+            </a:r>
+            <a:endParaRPr kumimoji="1" lang="zh-CN" altLang="en-US" sz="1200" baseline="-25000"/>
+          </a:p>
+        </p:txBody>
+      </p:sp>
+      <p:cxnSp>
+        <p:nvCxnSpPr>
+          <p:cNvPr id="51" name="直线箭头连接符 50"/>
+          <p:cNvCxnSpPr>
+            <a:stCxn id="35" idx="2"/>
+          </p:cNvCxnSpPr>
+          <p:nvPr/>
+        </p:nvCxnSpPr>
+        <p:spPr>
+          <a:xfrm flipH="1">
+            <a:off x="2193768" y="4194432"/>
+            <a:ext cx="764341" cy="299758"/>
+          </a:xfrm>
+          <a:prstGeom prst="straightConnector1">
+            <a:avLst/>
+          </a:prstGeom>
+          <a:ln w="19050">
+            <a:solidFill>
+              <a:schemeClr val="tx1"/>
+            </a:solidFill>
+            <a:tailEnd type="triangle"/>
+          </a:ln>
+        </p:spPr>
+        <p:style>
+          <a:lnRef idx="1">
+            <a:schemeClr val="accent1"/>
+          </a:lnRef>
+          <a:fillRef idx="0">
+            <a:schemeClr val="accent1"/>
+          </a:fillRef>
+          <a:effectRef idx="0">
+            <a:schemeClr val="accent1"/>
+          </a:effectRef>
+          <a:fontRef idx="minor">
+            <a:schemeClr val="tx1"/>
+          </a:fontRef>
+        </p:style>
+      </p:cxnSp>
+      <p:cxnSp>
+        <p:nvCxnSpPr>
+          <p:cNvPr id="52" name="直线箭头连接符 51"/>
+          <p:cNvCxnSpPr>
+            <a:stCxn id="35" idx="2"/>
+            <a:endCxn id="42" idx="0"/>
+          </p:cNvCxnSpPr>
+          <p:nvPr/>
+        </p:nvCxnSpPr>
+        <p:spPr>
+          <a:xfrm>
+            <a:off x="2958109" y="4194432"/>
+            <a:ext cx="7261" cy="305498"/>
+          </a:xfrm>
+          <a:prstGeom prst="straightConnector1">
+            <a:avLst/>
+          </a:prstGeom>
+          <a:ln w="19050">
+            <a:solidFill>
+              <a:schemeClr val="tx1"/>
+            </a:solidFill>
+            <a:tailEnd type="triangle"/>
+          </a:ln>
+        </p:spPr>
+        <p:style>
+          <a:lnRef idx="1">
+            <a:schemeClr val="accent1"/>
+          </a:lnRef>
+          <a:fillRef idx="0">
+            <a:schemeClr val="accent1"/>
+          </a:fillRef>
+          <a:effectRef idx="0">
+            <a:schemeClr val="accent1"/>
+          </a:effectRef>
+          <a:fontRef idx="minor">
+            <a:schemeClr val="tx1"/>
+          </a:fontRef>
+        </p:style>
+      </p:cxnSp>
+      <p:cxnSp>
+        <p:nvCxnSpPr>
+          <p:cNvPr id="55" name="直线箭头连接符 54"/>
+          <p:cNvCxnSpPr>
+            <a:endCxn id="43" idx="0"/>
+          </p:cNvCxnSpPr>
+          <p:nvPr/>
+        </p:nvCxnSpPr>
+        <p:spPr>
+          <a:xfrm>
+            <a:off x="2958109" y="4202558"/>
+            <a:ext cx="778863" cy="297372"/>
+          </a:xfrm>
+          <a:prstGeom prst="straightConnector1">
+            <a:avLst/>
+          </a:prstGeom>
+          <a:ln w="19050">
+            <a:solidFill>
+              <a:schemeClr val="tx1"/>
+            </a:solidFill>
+            <a:tailEnd type="triangle"/>
+          </a:ln>
+        </p:spPr>
+        <p:style>
+          <a:lnRef idx="1">
+            <a:schemeClr val="accent1"/>
+          </a:lnRef>
+          <a:fillRef idx="0">
+            <a:schemeClr val="accent1"/>
+          </a:fillRef>
+          <a:effectRef idx="0">
+            <a:schemeClr val="accent1"/>
+          </a:effectRef>
+          <a:fontRef idx="minor">
+            <a:schemeClr val="tx1"/>
+          </a:fontRef>
+        </p:style>
+      </p:cxnSp>
+      <p:cxnSp>
+        <p:nvCxnSpPr>
+          <p:cNvPr id="58" name="直线箭头连接符 57"/>
+          <p:cNvCxnSpPr>
+            <a:stCxn id="39" idx="2"/>
+            <a:endCxn id="46" idx="0"/>
+          </p:cNvCxnSpPr>
+          <p:nvPr/>
+        </p:nvCxnSpPr>
+        <p:spPr>
+          <a:xfrm>
+            <a:off x="5797880" y="4194432"/>
+            <a:ext cx="488339" cy="299758"/>
+          </a:xfrm>
+          <a:prstGeom prst="straightConnector1">
+            <a:avLst/>
+          </a:prstGeom>
+          <a:ln w="19050">
+            <a:solidFill>
+              <a:schemeClr val="tx1"/>
+            </a:solidFill>
+            <a:tailEnd type="triangle"/>
+          </a:ln>
+        </p:spPr>
+        <p:style>
+          <a:lnRef idx="1">
+            <a:schemeClr val="accent1"/>
+          </a:lnRef>
+          <a:fillRef idx="0">
+            <a:schemeClr val="accent1"/>
+          </a:fillRef>
+          <a:effectRef idx="0">
+            <a:schemeClr val="accent1"/>
+          </a:effectRef>
+          <a:fontRef idx="minor">
+            <a:schemeClr val="tx1"/>
+          </a:fontRef>
+        </p:style>
+      </p:cxnSp>
+      <p:cxnSp>
+        <p:nvCxnSpPr>
+          <p:cNvPr id="59" name="直线箭头连接符 58"/>
+          <p:cNvCxnSpPr>
+            <a:stCxn id="39" idx="2"/>
+            <a:endCxn id="45" idx="0"/>
+          </p:cNvCxnSpPr>
+          <p:nvPr/>
+        </p:nvCxnSpPr>
+        <p:spPr>
+          <a:xfrm flipH="1">
+            <a:off x="5514617" y="4194432"/>
+            <a:ext cx="283263" cy="299758"/>
+          </a:xfrm>
+          <a:prstGeom prst="straightConnector1">
+            <a:avLst/>
+          </a:prstGeom>
+          <a:ln w="19050">
+            <a:solidFill>
+              <a:schemeClr val="tx1"/>
+            </a:solidFill>
+            <a:tailEnd type="triangle"/>
+          </a:ln>
+        </p:spPr>
+        <p:style>
+          <a:lnRef idx="1">
+            <a:schemeClr val="accent1"/>
+          </a:lnRef>
+          <a:fillRef idx="0">
+            <a:schemeClr val="accent1"/>
+          </a:fillRef>
+          <a:effectRef idx="0">
+            <a:schemeClr val="accent1"/>
+          </a:effectRef>
+          <a:fontRef idx="minor">
+            <a:schemeClr val="tx1"/>
+          </a:fontRef>
+        </p:style>
+      </p:cxnSp>
+      <p:cxnSp>
+        <p:nvCxnSpPr>
+          <p:cNvPr id="60" name="直线箭头连接符 59"/>
+          <p:cNvCxnSpPr>
+            <a:stCxn id="39" idx="2"/>
+            <a:endCxn id="47" idx="0"/>
+          </p:cNvCxnSpPr>
+          <p:nvPr/>
+        </p:nvCxnSpPr>
+        <p:spPr>
+          <a:xfrm>
+            <a:off x="5797880" y="4194432"/>
+            <a:ext cx="1259941" cy="299758"/>
+          </a:xfrm>
+          <a:prstGeom prst="straightConnector1">
+            <a:avLst/>
+          </a:prstGeom>
+          <a:ln w="19050">
+            <a:solidFill>
+              <a:schemeClr val="tx1"/>
+            </a:solidFill>
+            <a:tailEnd type="triangle"/>
+          </a:ln>
+        </p:spPr>
+        <p:style>
+          <a:lnRef idx="1">
+            <a:schemeClr val="accent1"/>
+          </a:lnRef>
+          <a:fillRef idx="0">
+            <a:schemeClr val="accent1"/>
+          </a:fillRef>
+          <a:effectRef idx="0">
+            <a:schemeClr val="accent1"/>
+          </a:effectRef>
+          <a:fontRef idx="minor">
+            <a:schemeClr val="tx1"/>
+          </a:fontRef>
+        </p:style>
+      </p:cxnSp>
+      <p:cxnSp>
+        <p:nvCxnSpPr>
+          <p:cNvPr id="75" name="直线箭头连接符 74"/>
+          <p:cNvCxnSpPr>
+            <a:stCxn id="41" idx="2"/>
+          </p:cNvCxnSpPr>
+          <p:nvPr/>
+        </p:nvCxnSpPr>
+        <p:spPr>
+          <a:xfrm flipH="1">
+            <a:off x="1506354" y="4859930"/>
+            <a:ext cx="687414" cy="666867"/>
+          </a:xfrm>
+          <a:prstGeom prst="straightConnector1">
+            <a:avLst/>
+          </a:prstGeom>
+          <a:ln w="19050">
+            <a:solidFill>
+              <a:srgbClr val="FFC000"/>
+            </a:solidFill>
+            <a:tailEnd type="triangle"/>
+          </a:ln>
+        </p:spPr>
+        <p:style>
+          <a:lnRef idx="1">
+            <a:schemeClr val="accent1"/>
+          </a:lnRef>
+          <a:fillRef idx="0">
+            <a:schemeClr val="accent1"/>
+          </a:fillRef>
+          <a:effectRef idx="0">
+            <a:schemeClr val="accent1"/>
+          </a:effectRef>
+          <a:fontRef idx="minor">
+            <a:schemeClr val="tx1"/>
+          </a:fontRef>
+        </p:style>
+      </p:cxnSp>
+      <p:cxnSp>
+        <p:nvCxnSpPr>
+          <p:cNvPr id="78" name="直线箭头连接符 77"/>
+          <p:cNvCxnSpPr/>
+          <p:nvPr/>
+        </p:nvCxnSpPr>
+        <p:spPr>
+          <a:xfrm>
+            <a:off x="2958109" y="4860616"/>
+            <a:ext cx="1099453" cy="677661"/>
+          </a:xfrm>
+          <a:prstGeom prst="straightConnector1">
+            <a:avLst/>
+          </a:prstGeom>
+          <a:ln w="19050">
+            <a:solidFill>
+              <a:srgbClr val="FFC000"/>
+            </a:solidFill>
+            <a:tailEnd type="triangle"/>
+          </a:ln>
+        </p:spPr>
+        <p:style>
+          <a:lnRef idx="1">
+            <a:schemeClr val="accent1"/>
+          </a:lnRef>
+          <a:fillRef idx="0">
+            <a:schemeClr val="accent1"/>
+          </a:fillRef>
+          <a:effectRef idx="0">
+            <a:schemeClr val="accent1"/>
+          </a:effectRef>
+          <a:fontRef idx="minor">
+            <a:schemeClr val="tx1"/>
+          </a:fontRef>
+        </p:style>
+      </p:cxnSp>
+      <p:cxnSp>
+        <p:nvCxnSpPr>
+          <p:cNvPr id="81" name="直线箭头连接符 80"/>
+          <p:cNvCxnSpPr>
+            <a:stCxn id="43" idx="2"/>
+          </p:cNvCxnSpPr>
+          <p:nvPr/>
+        </p:nvCxnSpPr>
+        <p:spPr>
+          <a:xfrm>
+            <a:off x="3736972" y="4859930"/>
+            <a:ext cx="2808207" cy="666867"/>
+          </a:xfrm>
+          <a:prstGeom prst="straightConnector1">
+            <a:avLst/>
+          </a:prstGeom>
+          <a:ln w="19050">
+            <a:solidFill>
+              <a:srgbClr val="FFC000"/>
+            </a:solidFill>
+            <a:tailEnd type="triangle"/>
+          </a:ln>
+        </p:spPr>
+        <p:style>
+          <a:lnRef idx="1">
+            <a:schemeClr val="accent1"/>
+          </a:lnRef>
+          <a:fillRef idx="0">
+            <a:schemeClr val="accent1"/>
+          </a:fillRef>
+          <a:effectRef idx="0">
+            <a:schemeClr val="accent1"/>
+          </a:effectRef>
+          <a:fontRef idx="minor">
+            <a:schemeClr val="tx1"/>
+          </a:fontRef>
+        </p:style>
+      </p:cxnSp>
+      <p:cxnSp>
+        <p:nvCxnSpPr>
+          <p:cNvPr id="87" name="直线箭头连接符 86"/>
+          <p:cNvCxnSpPr>
+            <a:stCxn id="45" idx="2"/>
+          </p:cNvCxnSpPr>
+          <p:nvPr/>
+        </p:nvCxnSpPr>
+        <p:spPr>
+          <a:xfrm flipH="1">
+            <a:off x="2951949" y="4854190"/>
+            <a:ext cx="2562668" cy="678347"/>
+          </a:xfrm>
+          <a:prstGeom prst="straightConnector1">
+            <a:avLst/>
+          </a:prstGeom>
+          <a:ln w="19050">
+            <a:solidFill>
+              <a:srgbClr val="00B0F0"/>
+            </a:solidFill>
+            <a:tailEnd type="triangle"/>
+          </a:ln>
+        </p:spPr>
+        <p:style>
+          <a:lnRef idx="1">
+            <a:schemeClr val="accent1"/>
+          </a:lnRef>
+          <a:fillRef idx="0">
+            <a:schemeClr val="accent1"/>
+          </a:fillRef>
+          <a:effectRef idx="0">
+            <a:schemeClr val="accent1"/>
+          </a:effectRef>
+          <a:fontRef idx="minor">
+            <a:schemeClr val="tx1"/>
+          </a:fontRef>
+        </p:style>
+      </p:cxnSp>
+      <p:cxnSp>
+        <p:nvCxnSpPr>
+          <p:cNvPr id="90" name="直线箭头连接符 89"/>
+          <p:cNvCxnSpPr>
+            <a:stCxn id="46" idx="2"/>
+          </p:cNvCxnSpPr>
+          <p:nvPr/>
+        </p:nvCxnSpPr>
+        <p:spPr>
+          <a:xfrm flipH="1">
+            <a:off x="4057562" y="4854190"/>
+            <a:ext cx="2228657" cy="678347"/>
+          </a:xfrm>
+          <a:prstGeom prst="straightConnector1">
+            <a:avLst/>
+          </a:prstGeom>
+          <a:ln w="19050">
+            <a:solidFill>
+              <a:srgbClr val="00B0F0"/>
+            </a:solidFill>
+            <a:tailEnd type="triangle"/>
+          </a:ln>
+        </p:spPr>
+        <p:style>
+          <a:lnRef idx="1">
+            <a:schemeClr val="accent1"/>
+          </a:lnRef>
+          <a:fillRef idx="0">
+            <a:schemeClr val="accent1"/>
+          </a:fillRef>
+          <a:effectRef idx="0">
+            <a:schemeClr val="accent1"/>
+          </a:effectRef>
+          <a:fontRef idx="minor">
+            <a:schemeClr val="tx1"/>
+          </a:fontRef>
+        </p:style>
+      </p:cxnSp>
+      <p:cxnSp>
+        <p:nvCxnSpPr>
+          <p:cNvPr id="93" name="直线箭头连接符 92"/>
+          <p:cNvCxnSpPr>
+            <a:stCxn id="47" idx="2"/>
+          </p:cNvCxnSpPr>
+          <p:nvPr/>
+        </p:nvCxnSpPr>
+        <p:spPr>
+          <a:xfrm>
+            <a:off x="7057821" y="4854190"/>
+            <a:ext cx="234441" cy="671921"/>
+          </a:xfrm>
+          <a:prstGeom prst="straightConnector1">
+            <a:avLst/>
+          </a:prstGeom>
+          <a:ln w="19050">
+            <a:solidFill>
+              <a:srgbClr val="00B0F0"/>
+            </a:solidFill>
+            <a:tailEnd type="triangle"/>
+          </a:ln>
+        </p:spPr>
+        <p:style>
+          <a:lnRef idx="1">
+            <a:schemeClr val="accent1"/>
+          </a:lnRef>
+          <a:fillRef idx="0">
+            <a:schemeClr val="accent1"/>
+          </a:fillRef>
+          <a:effectRef idx="0">
+            <a:schemeClr val="accent1"/>
+          </a:effectRef>
+          <a:fontRef idx="minor">
+            <a:schemeClr val="tx1"/>
+          </a:fontRef>
+        </p:style>
+      </p:cxnSp>
+      <p:sp>
+        <p:nvSpPr>
+          <p:cNvPr id="96" name="矩形 95"/>
+          <p:cNvSpPr/>
+          <p:nvPr/>
+        </p:nvSpPr>
+        <p:spPr>
+          <a:xfrm>
+            <a:off x="3854450" y="5708650"/>
+            <a:ext cx="352425" cy="177461"/>
+          </a:xfrm>
+          <a:prstGeom prst="rect">
+            <a:avLst/>
+          </a:prstGeom>
+          <a:solidFill>
+            <a:srgbClr val="00B0F0"/>
+          </a:solidFill>
+        </p:spPr>
+        <p:style>
+          <a:lnRef idx="2">
+            <a:schemeClr val="accent1">
+              <a:shade val="50000"/>
+            </a:schemeClr>
+          </a:lnRef>
+          <a:fillRef idx="1">
+            <a:schemeClr val="accent1"/>
+          </a:fillRef>
+          <a:effectRef idx="0">
+            <a:schemeClr val="accent1"/>
+          </a:effectRef>
+          <a:fontRef idx="minor">
+            <a:schemeClr val="lt1"/>
+          </a:fontRef>
+        </p:style>
+        <p:txBody>
+          <a:bodyPr rtlCol="0" anchor="ctr"/>
+          <a:lstStyle/>
+          <a:p>
+            <a:pPr algn="ctr"/>
+            <a:endParaRPr kumimoji="1" lang="zh-CN" altLang="en-US"/>
+          </a:p>
+        </p:txBody>
+      </p:sp>
+    </p:spTree>
+    <p:extLst>
+      <p:ext uri="{BB962C8B-B14F-4D97-AF65-F5344CB8AC3E}">
+        <p14:creationId xmlns:p14="http://schemas.microsoft.com/office/powerpoint/2010/main" val="298623580"/>
+      </p:ext>
+    </p:extLst>
+  </p:cSld>
+  <p:clrMapOvr>
+    <a:masterClrMapping/>
+  </p:clrMapOvr>
+  <p:timing>
+    <p:tnLst>
+      <p:par>
+        <p:cTn id="1" dur="indefinite" restart="never" nodeType="tmRoot"/>
+      </p:par>
+    </p:tnLst>
+  </p:timing>
+</p:sld>
+</file>
+
 <file path=ppt/slides/slide2.xml><?xml version="1.0" encoding="utf-8"?>
 <p:sld xmlns:a="http://schemas.openxmlformats.org/drawingml/2006/main" xmlns:r="http://schemas.openxmlformats.org/officeDocument/2006/relationships" xmlns:p="http://schemas.openxmlformats.org/presentationml/2006/main">
   <p:cSld>

</xml_diff>